<commit_message>
Review migration tool documentation.
</commit_message>
<xml_diff>
--- a/content/developerportal/deploy/attachments/migrating-to-v4/migration-flow.pptx
+++ b/content/developerportal/deploy/attachments/migrating-to-v4/migration-flow.pptx
@@ -5,11 +5,10 @@
     <p:sldMasterId id="2147483648" r:id="rId1"/>
   </p:sldMasterIdLst>
   <p:notesMasterIdLst>
-    <p:notesMasterId r:id="rId4"/>
+    <p:notesMasterId r:id="rId3"/>
   </p:notesMasterIdLst>
   <p:sldIdLst>
-    <p:sldId id="258" r:id="rId2"/>
-    <p:sldId id="259" r:id="rId3"/>
+    <p:sldId id="259" r:id="rId2"/>
   </p:sldIdLst>
   <p:sldSz cx="6858000" cy="9906000" type="A4"/>
   <p:notesSz cx="6858000" cy="9144000"/>
@@ -209,7 +208,7 @@
           <a:p>
             <a:fld id="{3D23F9CD-B744-44B2-830A-3F4CE93BD143}" type="datetimeFigureOut">
               <a:rPr lang="en-US" smtClean="0"/>
-              <a:t>4/21/2021</a:t>
+              <a:t>4/22/2021</a:t>
             </a:fld>
             <a:endParaRPr lang="en-US"/>
           </a:p>
@@ -476,95 +475,6 @@
 </p:notesMaster>
 </file>
 
-<file path=ppt/notesSlides/notesSlide1.xml><?xml version="1.0" encoding="utf-8"?>
-<p:notes xmlns:a="http://schemas.openxmlformats.org/drawingml/2006/main" xmlns:r="http://schemas.openxmlformats.org/officeDocument/2006/relationships" xmlns:p="http://schemas.openxmlformats.org/presentationml/2006/main">
-  <p:cSld>
-    <p:spTree>
-      <p:nvGrpSpPr>
-        <p:cNvPr id="1" name=""/>
-        <p:cNvGrpSpPr/>
-        <p:nvPr/>
-      </p:nvGrpSpPr>
-      <p:grpSpPr>
-        <a:xfrm>
-          <a:off x="0" y="0"/>
-          <a:ext cx="0" cy="0"/>
-          <a:chOff x="0" y="0"/>
-          <a:chExt cx="0" cy="0"/>
-        </a:xfrm>
-      </p:grpSpPr>
-      <p:sp>
-        <p:nvSpPr>
-          <p:cNvPr id="2" name="Slide Image Placeholder 1"/>
-          <p:cNvSpPr>
-            <a:spLocks noGrp="1" noRot="1" noChangeAspect="1"/>
-          </p:cNvSpPr>
-          <p:nvPr>
-            <p:ph type="sldImg"/>
-          </p:nvPr>
-        </p:nvSpPr>
-        <p:spPr>
-          <a:xfrm>
-            <a:off x="2360613" y="1143000"/>
-            <a:ext cx="2136775" cy="3086100"/>
-          </a:xfrm>
-        </p:spPr>
-      </p:sp>
-      <p:sp>
-        <p:nvSpPr>
-          <p:cNvPr id="3" name="Notes Placeholder 2"/>
-          <p:cNvSpPr>
-            <a:spLocks noGrp="1"/>
-          </p:cNvSpPr>
-          <p:nvPr>
-            <p:ph type="body" idx="1"/>
-          </p:nvPr>
-        </p:nvSpPr>
-        <p:spPr/>
-        <p:txBody>
-          <a:bodyPr/>
-          <a:lstStyle/>
-          <a:p>
-            <a:endParaRPr lang="en-US" dirty="0"/>
-          </a:p>
-        </p:txBody>
-      </p:sp>
-      <p:sp>
-        <p:nvSpPr>
-          <p:cNvPr id="4" name="Slide Number Placeholder 3"/>
-          <p:cNvSpPr>
-            <a:spLocks noGrp="1"/>
-          </p:cNvSpPr>
-          <p:nvPr>
-            <p:ph type="sldNum" sz="quarter" idx="5"/>
-          </p:nvPr>
-        </p:nvSpPr>
-        <p:spPr/>
-        <p:txBody>
-          <a:bodyPr/>
-          <a:lstStyle/>
-          <a:p>
-            <a:fld id="{0DC8A3CD-5F20-4533-8FB0-463607DB9384}" type="slidenum">
-              <a:rPr lang="en-US" smtClean="0"/>
-              <a:t>1</a:t>
-            </a:fld>
-            <a:endParaRPr lang="en-US"/>
-          </a:p>
-        </p:txBody>
-      </p:sp>
-    </p:spTree>
-    <p:extLst>
-      <p:ext uri="{BB962C8B-B14F-4D97-AF65-F5344CB8AC3E}">
-        <p14:creationId xmlns:p14="http://schemas.microsoft.com/office/powerpoint/2010/main" val="4289990474"/>
-      </p:ext>
-    </p:extLst>
-  </p:cSld>
-  <p:clrMapOvr>
-    <a:masterClrMapping/>
-  </p:clrMapOvr>
-</p:notes>
-</file>
-
 <file path=ppt/slideLayouts/slideLayout1.xml><?xml version="1.0" encoding="utf-8"?>
 <p:sldLayout xmlns:a="http://schemas.openxmlformats.org/drawingml/2006/main" xmlns:r="http://schemas.openxmlformats.org/officeDocument/2006/relationships" xmlns:p="http://schemas.openxmlformats.org/presentationml/2006/main" type="title" preserve="1">
   <p:cSld name="Title Slide">
@@ -712,7 +622,7 @@
           <a:p>
             <a:fld id="{3E9CF523-6C64-4D36-A48B-97DFA6E57496}" type="datetimeFigureOut">
               <a:rPr lang="en-US" smtClean="0"/>
-              <a:t>4/21/2021</a:t>
+              <a:t>4/22/2021</a:t>
             </a:fld>
             <a:endParaRPr lang="en-US"/>
           </a:p>
@@ -910,7 +820,7 @@
           <a:p>
             <a:fld id="{3E9CF523-6C64-4D36-A48B-97DFA6E57496}" type="datetimeFigureOut">
               <a:rPr lang="en-US" smtClean="0"/>
-              <a:t>4/21/2021</a:t>
+              <a:t>4/22/2021</a:t>
             </a:fld>
             <a:endParaRPr lang="en-US"/>
           </a:p>
@@ -1118,7 +1028,7 @@
           <a:p>
             <a:fld id="{3E9CF523-6C64-4D36-A48B-97DFA6E57496}" type="datetimeFigureOut">
               <a:rPr lang="en-US" smtClean="0"/>
-              <a:t>4/21/2021</a:t>
+              <a:t>4/22/2021</a:t>
             </a:fld>
             <a:endParaRPr lang="en-US"/>
           </a:p>
@@ -1316,7 +1226,7 @@
           <a:p>
             <a:fld id="{3E9CF523-6C64-4D36-A48B-97DFA6E57496}" type="datetimeFigureOut">
               <a:rPr lang="en-US" smtClean="0"/>
-              <a:t>4/21/2021</a:t>
+              <a:t>4/22/2021</a:t>
             </a:fld>
             <a:endParaRPr lang="en-US"/>
           </a:p>
@@ -1591,7 +1501,7 @@
           <a:p>
             <a:fld id="{3E9CF523-6C64-4D36-A48B-97DFA6E57496}" type="datetimeFigureOut">
               <a:rPr lang="en-US" smtClean="0"/>
-              <a:t>4/21/2021</a:t>
+              <a:t>4/22/2021</a:t>
             </a:fld>
             <a:endParaRPr lang="en-US"/>
           </a:p>
@@ -1856,7 +1766,7 @@
           <a:p>
             <a:fld id="{3E9CF523-6C64-4D36-A48B-97DFA6E57496}" type="datetimeFigureOut">
               <a:rPr lang="en-US" smtClean="0"/>
-              <a:t>4/21/2021</a:t>
+              <a:t>4/22/2021</a:t>
             </a:fld>
             <a:endParaRPr lang="en-US"/>
           </a:p>
@@ -2268,7 +2178,7 @@
           <a:p>
             <a:fld id="{3E9CF523-6C64-4D36-A48B-97DFA6E57496}" type="datetimeFigureOut">
               <a:rPr lang="en-US" smtClean="0"/>
-              <a:t>4/21/2021</a:t>
+              <a:t>4/22/2021</a:t>
             </a:fld>
             <a:endParaRPr lang="en-US"/>
           </a:p>
@@ -2409,7 +2319,7 @@
           <a:p>
             <a:fld id="{3E9CF523-6C64-4D36-A48B-97DFA6E57496}" type="datetimeFigureOut">
               <a:rPr lang="en-US" smtClean="0"/>
-              <a:t>4/21/2021</a:t>
+              <a:t>4/22/2021</a:t>
             </a:fld>
             <a:endParaRPr lang="en-US"/>
           </a:p>
@@ -2522,7 +2432,7 @@
           <a:p>
             <a:fld id="{3E9CF523-6C64-4D36-A48B-97DFA6E57496}" type="datetimeFigureOut">
               <a:rPr lang="en-US" smtClean="0"/>
-              <a:t>4/21/2021</a:t>
+              <a:t>4/22/2021</a:t>
             </a:fld>
             <a:endParaRPr lang="en-US"/>
           </a:p>
@@ -2833,7 +2743,7 @@
           <a:p>
             <a:fld id="{3E9CF523-6C64-4D36-A48B-97DFA6E57496}" type="datetimeFigureOut">
               <a:rPr lang="en-US" smtClean="0"/>
-              <a:t>4/21/2021</a:t>
+              <a:t>4/22/2021</a:t>
             </a:fld>
             <a:endParaRPr lang="en-US"/>
           </a:p>
@@ -3124,7 +3034,7 @@
           <a:p>
             <a:fld id="{3E9CF523-6C64-4D36-A48B-97DFA6E57496}" type="datetimeFigureOut">
               <a:rPr lang="en-US" smtClean="0"/>
-              <a:t>4/21/2021</a:t>
+              <a:t>4/22/2021</a:t>
             </a:fld>
             <a:endParaRPr lang="en-US"/>
           </a:p>
@@ -3365,7 +3275,7 @@
           <a:p>
             <a:fld id="{3E9CF523-6C64-4D36-A48B-97DFA6E57496}" type="datetimeFigureOut">
               <a:rPr lang="en-US" smtClean="0"/>
-              <a:t>4/21/2021</a:t>
+              <a:t>4/22/2021</a:t>
             </a:fld>
             <a:endParaRPr lang="en-US"/>
           </a:p>
@@ -3782,2851 +3692,6 @@
           <a:chExt cx="0" cy="0"/>
         </a:xfrm>
       </p:grpSpPr>
-      <p:grpSp>
-        <p:nvGrpSpPr>
-          <p:cNvPr id="24" name="Runtime Core Group">
-            <a:extLst>
-              <a:ext uri="{FF2B5EF4-FFF2-40B4-BE49-F238E27FC236}">
-                <a16:creationId xmlns:a16="http://schemas.microsoft.com/office/drawing/2014/main" id="{096386CC-C000-415C-81DA-52ADBE529B3A}"/>
-              </a:ext>
-            </a:extLst>
-          </p:cNvPr>
-          <p:cNvGrpSpPr/>
-          <p:nvPr/>
-        </p:nvGrpSpPr>
-        <p:grpSpPr>
-          <a:xfrm>
-            <a:off x="1606972" y="3394870"/>
-            <a:ext cx="3600905" cy="2473640"/>
-            <a:chOff x="1849714" y="1173465"/>
-            <a:chExt cx="6089106" cy="3078201"/>
-          </a:xfrm>
-        </p:grpSpPr>
-        <p:sp>
-          <p:nvSpPr>
-            <p:cNvPr id="53" name="!!Runtime">
-              <a:extLst>
-                <a:ext uri="{FF2B5EF4-FFF2-40B4-BE49-F238E27FC236}">
-                  <a16:creationId xmlns:a16="http://schemas.microsoft.com/office/drawing/2014/main" id="{F45A443A-98B1-4DD4-A781-61A7AD2B3737}"/>
-                </a:ext>
-              </a:extLst>
-            </p:cNvPr>
-            <p:cNvSpPr/>
-            <p:nvPr/>
-          </p:nvSpPr>
-          <p:spPr>
-            <a:xfrm>
-              <a:off x="1849714" y="1202454"/>
-              <a:ext cx="6089106" cy="3049212"/>
-            </a:xfrm>
-            <a:prstGeom prst="flowChartProcess">
-              <a:avLst/>
-            </a:prstGeom>
-            <a:pattFill prst="pct20">
-              <a:fgClr>
-                <a:schemeClr val="accent1"/>
-              </a:fgClr>
-              <a:bgClr>
-                <a:schemeClr val="bg1"/>
-              </a:bgClr>
-            </a:pattFill>
-            <a:ln w="76200">
-              <a:solidFill>
-                <a:schemeClr val="accent1"/>
-              </a:solidFill>
-            </a:ln>
-          </p:spPr>
-          <p:style>
-            <a:lnRef idx="2">
-              <a:schemeClr val="accent1">
-                <a:shade val="50000"/>
-              </a:schemeClr>
-            </a:lnRef>
-            <a:fillRef idx="1">
-              <a:schemeClr val="accent1"/>
-            </a:fillRef>
-            <a:effectRef idx="0">
-              <a:schemeClr val="accent1"/>
-            </a:effectRef>
-            <a:fontRef idx="minor">
-              <a:schemeClr val="lt1"/>
-            </a:fontRef>
-          </p:style>
-          <p:txBody>
-            <a:bodyPr rtlCol="0" anchor="t" anchorCtr="0"/>
-            <a:lstStyle/>
-            <a:p>
-              <a:r>
-                <a:rPr lang="en-US" sz="900" dirty="0">
-                  <a:solidFill>
-                    <a:schemeClr val="accent1"/>
-                  </a:solidFill>
-                </a:rPr>
-                <a:t>Runtime Core</a:t>
-              </a:r>
-            </a:p>
-          </p:txBody>
-        </p:sp>
-        <p:sp>
-          <p:nvSpPr>
-            <p:cNvPr id="20" name="Rectangle 19">
-              <a:extLst>
-                <a:ext uri="{FF2B5EF4-FFF2-40B4-BE49-F238E27FC236}">
-                  <a16:creationId xmlns:a16="http://schemas.microsoft.com/office/drawing/2014/main" id="{8D507EBE-80BC-4DF9-B35D-6C24C197054A}"/>
-                </a:ext>
-              </a:extLst>
-            </p:cNvPr>
-            <p:cNvSpPr/>
-            <p:nvPr/>
-          </p:nvSpPr>
-          <p:spPr>
-            <a:xfrm>
-              <a:off x="1849714" y="1173465"/>
-              <a:ext cx="45719" cy="45719"/>
-            </a:xfrm>
-            <a:prstGeom prst="rect">
-              <a:avLst/>
-            </a:prstGeom>
-            <a:ln>
-              <a:solidFill>
-                <a:schemeClr val="accent1"/>
-              </a:solidFill>
-            </a:ln>
-          </p:spPr>
-          <p:style>
-            <a:lnRef idx="2">
-              <a:schemeClr val="accent1">
-                <a:shade val="50000"/>
-              </a:schemeClr>
-            </a:lnRef>
-            <a:fillRef idx="1">
-              <a:schemeClr val="accent1"/>
-            </a:fillRef>
-            <a:effectRef idx="0">
-              <a:schemeClr val="accent1"/>
-            </a:effectRef>
-            <a:fontRef idx="minor">
-              <a:schemeClr val="lt1"/>
-            </a:fontRef>
-          </p:style>
-          <p:txBody>
-            <a:bodyPr rtlCol="0" anchor="ctr"/>
-            <a:lstStyle/>
-            <a:p>
-              <a:pPr algn="ctr"/>
-              <a:endParaRPr lang="en-US" sz="900"/>
-            </a:p>
-          </p:txBody>
-        </p:sp>
-      </p:grpSp>
-      <p:sp>
-        <p:nvSpPr>
-          <p:cNvPr id="2" name="TextBox 1">
-            <a:extLst>
-              <a:ext uri="{FF2B5EF4-FFF2-40B4-BE49-F238E27FC236}">
-                <a16:creationId xmlns:a16="http://schemas.microsoft.com/office/drawing/2014/main" id="{A419F769-57C0-463C-999D-988003BDD3CD}"/>
-              </a:ext>
-            </a:extLst>
-          </p:cNvPr>
-          <p:cNvSpPr txBox="1"/>
-          <p:nvPr/>
-        </p:nvSpPr>
-        <p:spPr>
-          <a:xfrm>
-            <a:off x="2568625" y="3058436"/>
-            <a:ext cx="1700004" cy="317894"/>
-          </a:xfrm>
-          <a:prstGeom prst="rect">
-            <a:avLst/>
-          </a:prstGeom>
-          <a:noFill/>
-        </p:spPr>
-        <p:txBody>
-          <a:bodyPr wrap="none" lIns="20250" tIns="20250" rIns="20250" bIns="20250" rtlCol="0" anchor="t" anchorCtr="1">
-            <a:spAutoFit/>
-          </a:bodyPr>
-          <a:lstStyle/>
-          <a:p>
-            <a:r>
-              <a:rPr lang="en-US" dirty="0"/>
-              <a:t>Runtime Server</a:t>
-            </a:r>
-          </a:p>
-        </p:txBody>
-      </p:sp>
-      <p:sp>
-        <p:nvSpPr>
-          <p:cNvPr id="3" name="Flowchart: Magnetic Disk 2">
-            <a:extLst>
-              <a:ext uri="{FF2B5EF4-FFF2-40B4-BE49-F238E27FC236}">
-                <a16:creationId xmlns:a16="http://schemas.microsoft.com/office/drawing/2014/main" id="{54229726-B29A-4A81-86F4-793D2965A868}"/>
-              </a:ext>
-            </a:extLst>
-          </p:cNvPr>
-          <p:cNvSpPr>
-            <a:spLocks/>
-          </p:cNvSpPr>
-          <p:nvPr/>
-        </p:nvSpPr>
-        <p:spPr>
-          <a:xfrm>
-            <a:off x="720825" y="4430692"/>
-            <a:ext cx="708750" cy="430795"/>
-          </a:xfrm>
-          <a:prstGeom prst="flowChartMagneticDisk">
-            <a:avLst/>
-          </a:prstGeom>
-          <a:solidFill>
-            <a:schemeClr val="accent2">
-              <a:lumMod val="75000"/>
-            </a:schemeClr>
-          </a:solidFill>
-        </p:spPr>
-        <p:style>
-          <a:lnRef idx="2">
-            <a:schemeClr val="accent1">
-              <a:shade val="50000"/>
-            </a:schemeClr>
-          </a:lnRef>
-          <a:fillRef idx="1">
-            <a:schemeClr val="accent1"/>
-          </a:fillRef>
-          <a:effectRef idx="0">
-            <a:schemeClr val="accent1"/>
-          </a:effectRef>
-          <a:fontRef idx="minor">
-            <a:schemeClr val="lt1"/>
-          </a:fontRef>
-        </p:style>
-        <p:txBody>
-          <a:bodyPr rot="0" spcFirstLastPara="0" vertOverflow="overflow" horzOverflow="overflow" vert="horz" wrap="square" lIns="20250" tIns="40500" rIns="20250" bIns="0" numCol="1" spcCol="0" rtlCol="0" fromWordArt="0" anchor="ctr" anchorCtr="0" forceAA="0" compatLnSpc="1">
-            <a:prstTxWarp prst="textNoShape">
-              <a:avLst/>
-            </a:prstTxWarp>
-            <a:noAutofit/>
-          </a:bodyPr>
-          <a:lstStyle/>
-          <a:p>
-            <a:pPr algn="ctr"/>
-            <a:r>
-              <a:rPr lang="en-US" sz="900" dirty="0"/>
-              <a:t>Relational</a:t>
-            </a:r>
-            <a:br>
-              <a:rPr lang="en-US" sz="900" dirty="0"/>
-            </a:br>
-            <a:r>
-              <a:rPr lang="en-US" sz="900" dirty="0"/>
-              <a:t>Database</a:t>
-            </a:r>
-          </a:p>
-        </p:txBody>
-      </p:sp>
-      <p:sp>
-        <p:nvSpPr>
-          <p:cNvPr id="4" name="Flowchart: Process 3">
-            <a:extLst>
-              <a:ext uri="{FF2B5EF4-FFF2-40B4-BE49-F238E27FC236}">
-                <a16:creationId xmlns:a16="http://schemas.microsoft.com/office/drawing/2014/main" id="{B53119BC-0892-4DA6-A013-F3C0357BFF36}"/>
-              </a:ext>
-            </a:extLst>
-          </p:cNvPr>
-          <p:cNvSpPr/>
-          <p:nvPr/>
-        </p:nvSpPr>
-        <p:spPr>
-          <a:xfrm>
-            <a:off x="1729947" y="4024579"/>
-            <a:ext cx="781962" cy="324000"/>
-          </a:xfrm>
-          <a:prstGeom prst="flowChartProcess">
-            <a:avLst/>
-          </a:prstGeom>
-        </p:spPr>
-        <p:style>
-          <a:lnRef idx="2">
-            <a:schemeClr val="accent1">
-              <a:shade val="50000"/>
-            </a:schemeClr>
-          </a:lnRef>
-          <a:fillRef idx="1">
-            <a:schemeClr val="accent1"/>
-          </a:fillRef>
-          <a:effectRef idx="0">
-            <a:schemeClr val="accent1"/>
-          </a:effectRef>
-          <a:fontRef idx="minor">
-            <a:schemeClr val="lt1"/>
-          </a:fontRef>
-        </p:style>
-        <p:txBody>
-          <a:bodyPr rot="0" spcFirstLastPara="0" vertOverflow="overflow" horzOverflow="overflow" vert="horz" wrap="none" lIns="20250" tIns="20250" rIns="20250" bIns="20250" numCol="1" spcCol="0" rtlCol="0" fromWordArt="0" anchor="ctr" anchorCtr="0" forceAA="0" compatLnSpc="1">
-            <a:prstTxWarp prst="textNoShape">
-              <a:avLst/>
-            </a:prstTxWarp>
-            <a:noAutofit/>
-          </a:bodyPr>
-          <a:lstStyle/>
-          <a:p>
-            <a:pPr algn="ctr"/>
-            <a:r>
-              <a:rPr lang="en-US" sz="788" dirty="0"/>
-              <a:t>Database</a:t>
-            </a:r>
-          </a:p>
-          <a:p>
-            <a:pPr algn="ctr"/>
-            <a:r>
-              <a:rPr lang="en-US" sz="788" dirty="0"/>
-              <a:t>Synchronization</a:t>
-            </a:r>
-          </a:p>
-        </p:txBody>
-      </p:sp>
-      <p:sp>
-        <p:nvSpPr>
-          <p:cNvPr id="5" name="Flowchart: Process 4">
-            <a:extLst>
-              <a:ext uri="{FF2B5EF4-FFF2-40B4-BE49-F238E27FC236}">
-                <a16:creationId xmlns:a16="http://schemas.microsoft.com/office/drawing/2014/main" id="{A2F98AF3-2C0C-43BD-AE87-89B4C34496DE}"/>
-              </a:ext>
-            </a:extLst>
-          </p:cNvPr>
-          <p:cNvSpPr/>
-          <p:nvPr/>
-        </p:nvSpPr>
-        <p:spPr>
-          <a:xfrm>
-            <a:off x="1766552" y="4484088"/>
-            <a:ext cx="708750" cy="324000"/>
-          </a:xfrm>
-          <a:prstGeom prst="flowChartProcess">
-            <a:avLst/>
-          </a:prstGeom>
-        </p:spPr>
-        <p:style>
-          <a:lnRef idx="2">
-            <a:schemeClr val="accent1">
-              <a:shade val="50000"/>
-            </a:schemeClr>
-          </a:lnRef>
-          <a:fillRef idx="1">
-            <a:schemeClr val="accent1"/>
-          </a:fillRef>
-          <a:effectRef idx="0">
-            <a:schemeClr val="accent1"/>
-          </a:effectRef>
-          <a:fontRef idx="minor">
-            <a:schemeClr val="lt1"/>
-          </a:fontRef>
-        </p:style>
-        <p:txBody>
-          <a:bodyPr rot="0" spcFirstLastPara="0" vertOverflow="overflow" horzOverflow="overflow" vert="horz" wrap="square" lIns="20250" tIns="20250" rIns="20250" bIns="20250" numCol="1" spcCol="0" rtlCol="0" fromWordArt="0" anchor="ctr" anchorCtr="0" forceAA="0" compatLnSpc="1">
-            <a:prstTxWarp prst="textNoShape">
-              <a:avLst/>
-            </a:prstTxWarp>
-            <a:noAutofit/>
-          </a:bodyPr>
-          <a:lstStyle/>
-          <a:p>
-            <a:pPr algn="ctr"/>
-            <a:r>
-              <a:rPr lang="en-US" sz="900" dirty="0"/>
-              <a:t>Query Executor</a:t>
-            </a:r>
-          </a:p>
-        </p:txBody>
-      </p:sp>
-      <p:sp>
-        <p:nvSpPr>
-          <p:cNvPr id="6" name="Flowchart: Process 5">
-            <a:extLst>
-              <a:ext uri="{FF2B5EF4-FFF2-40B4-BE49-F238E27FC236}">
-                <a16:creationId xmlns:a16="http://schemas.microsoft.com/office/drawing/2014/main" id="{DEC4D924-D6C5-4865-8C93-E302EF915036}"/>
-              </a:ext>
-            </a:extLst>
-          </p:cNvPr>
-          <p:cNvSpPr/>
-          <p:nvPr/>
-        </p:nvSpPr>
-        <p:spPr>
-          <a:xfrm>
-            <a:off x="3621732" y="3599273"/>
-            <a:ext cx="708750" cy="324000"/>
-          </a:xfrm>
-          <a:prstGeom prst="flowChartProcess">
-            <a:avLst/>
-          </a:prstGeom>
-        </p:spPr>
-        <p:style>
-          <a:lnRef idx="2">
-            <a:schemeClr val="accent1">
-              <a:shade val="50000"/>
-            </a:schemeClr>
-          </a:lnRef>
-          <a:fillRef idx="1">
-            <a:schemeClr val="accent1"/>
-          </a:fillRef>
-          <a:effectRef idx="0">
-            <a:schemeClr val="accent1"/>
-          </a:effectRef>
-          <a:fontRef idx="minor">
-            <a:schemeClr val="lt1"/>
-          </a:fontRef>
-        </p:style>
-        <p:txBody>
-          <a:bodyPr rot="0" spcFirstLastPara="0" vertOverflow="overflow" horzOverflow="overflow" vert="horz" wrap="square" lIns="20250" tIns="20250" rIns="20250" bIns="20250" numCol="1" spcCol="0" rtlCol="0" fromWordArt="0" anchor="ctr" anchorCtr="0" forceAA="0" compatLnSpc="1">
-            <a:prstTxWarp prst="textNoShape">
-              <a:avLst/>
-            </a:prstTxWarp>
-            <a:noAutofit/>
-          </a:bodyPr>
-          <a:lstStyle/>
-          <a:p>
-            <a:pPr algn="ctr"/>
-            <a:r>
-              <a:rPr lang="en-US" sz="900" dirty="0"/>
-              <a:t>File Storage</a:t>
-            </a:r>
-          </a:p>
-          <a:p>
-            <a:pPr algn="ctr"/>
-            <a:r>
-              <a:rPr lang="en-US" sz="900" dirty="0"/>
-              <a:t>Manager</a:t>
-            </a:r>
-          </a:p>
-        </p:txBody>
-      </p:sp>
-      <p:sp>
-        <p:nvSpPr>
-          <p:cNvPr id="9" name="Flowchart: Process 8">
-            <a:extLst>
-              <a:ext uri="{FF2B5EF4-FFF2-40B4-BE49-F238E27FC236}">
-                <a16:creationId xmlns:a16="http://schemas.microsoft.com/office/drawing/2014/main" id="{207F158F-3FCC-4D5D-859C-48FF56044F66}"/>
-              </a:ext>
-            </a:extLst>
-          </p:cNvPr>
-          <p:cNvSpPr/>
-          <p:nvPr/>
-        </p:nvSpPr>
-        <p:spPr>
-          <a:xfrm>
-            <a:off x="3623579" y="4484088"/>
-            <a:ext cx="708750" cy="324000"/>
-          </a:xfrm>
-          <a:prstGeom prst="flowChartProcess">
-            <a:avLst/>
-          </a:prstGeom>
-        </p:spPr>
-        <p:style>
-          <a:lnRef idx="2">
-            <a:schemeClr val="accent1">
-              <a:shade val="50000"/>
-            </a:schemeClr>
-          </a:lnRef>
-          <a:fillRef idx="1">
-            <a:schemeClr val="accent1"/>
-          </a:fillRef>
-          <a:effectRef idx="0">
-            <a:schemeClr val="accent1"/>
-          </a:effectRef>
-          <a:fontRef idx="minor">
-            <a:schemeClr val="lt1"/>
-          </a:fontRef>
-        </p:style>
-        <p:txBody>
-          <a:bodyPr rot="0" spcFirstLastPara="0" vertOverflow="overflow" horzOverflow="overflow" vert="horz" wrap="square" lIns="20250" tIns="20250" rIns="20250" bIns="20250" numCol="1" spcCol="0" rtlCol="0" fromWordArt="0" anchor="ctr" anchorCtr="0" forceAA="0" compatLnSpc="1">
-            <a:prstTxWarp prst="textNoShape">
-              <a:avLst/>
-            </a:prstTxWarp>
-            <a:noAutofit/>
-          </a:bodyPr>
-          <a:lstStyle/>
-          <a:p>
-            <a:pPr algn="ctr"/>
-            <a:r>
-              <a:rPr lang="en-US" sz="900" dirty="0"/>
-              <a:t>Microflow Engine</a:t>
-            </a:r>
-          </a:p>
-        </p:txBody>
-      </p:sp>
-      <p:sp>
-        <p:nvSpPr>
-          <p:cNvPr id="11" name="Flowchart: Stored Data 10">
-            <a:extLst>
-              <a:ext uri="{FF2B5EF4-FFF2-40B4-BE49-F238E27FC236}">
-                <a16:creationId xmlns:a16="http://schemas.microsoft.com/office/drawing/2014/main" id="{667AC6AB-E11E-4D89-B4EA-09E624849405}"/>
-              </a:ext>
-            </a:extLst>
-          </p:cNvPr>
-          <p:cNvSpPr/>
-          <p:nvPr/>
-        </p:nvSpPr>
-        <p:spPr>
-          <a:xfrm>
-            <a:off x="1766552" y="3609398"/>
-            <a:ext cx="708750" cy="303750"/>
-          </a:xfrm>
-          <a:prstGeom prst="flowChartOnlineStorage">
-            <a:avLst/>
-          </a:prstGeom>
-        </p:spPr>
-        <p:style>
-          <a:lnRef idx="2">
-            <a:schemeClr val="accent1">
-              <a:shade val="50000"/>
-            </a:schemeClr>
-          </a:lnRef>
-          <a:fillRef idx="1">
-            <a:schemeClr val="accent1"/>
-          </a:fillRef>
-          <a:effectRef idx="0">
-            <a:schemeClr val="accent1"/>
-          </a:effectRef>
-          <a:fontRef idx="minor">
-            <a:schemeClr val="lt1"/>
-          </a:fontRef>
-        </p:style>
-        <p:txBody>
-          <a:bodyPr lIns="20250" tIns="20250" rIns="81000" bIns="20250" rtlCol="0" anchor="ctr"/>
-          <a:lstStyle/>
-          <a:p>
-            <a:pPr algn="ctr"/>
-            <a:r>
-              <a:rPr lang="en-US" sz="900" dirty="0"/>
-              <a:t>Project Model</a:t>
-            </a:r>
-          </a:p>
-        </p:txBody>
-      </p:sp>
-      <p:sp>
-        <p:nvSpPr>
-          <p:cNvPr id="15" name="Flowchart: Stored Data 14">
-            <a:extLst>
-              <a:ext uri="{FF2B5EF4-FFF2-40B4-BE49-F238E27FC236}">
-                <a16:creationId xmlns:a16="http://schemas.microsoft.com/office/drawing/2014/main" id="{AAEC1D11-A191-472A-8E0F-9E0665F8EF36}"/>
-              </a:ext>
-            </a:extLst>
-          </p:cNvPr>
-          <p:cNvSpPr/>
-          <p:nvPr/>
-        </p:nvSpPr>
-        <p:spPr>
-          <a:xfrm>
-            <a:off x="2699046" y="3575241"/>
-            <a:ext cx="769504" cy="372067"/>
-          </a:xfrm>
-          <a:prstGeom prst="flowChartOnlineStorage">
-            <a:avLst/>
-          </a:prstGeom>
-        </p:spPr>
-        <p:style>
-          <a:lnRef idx="2">
-            <a:schemeClr val="accent1">
-              <a:shade val="50000"/>
-            </a:schemeClr>
-          </a:lnRef>
-          <a:fillRef idx="1">
-            <a:schemeClr val="accent1"/>
-          </a:fillRef>
-          <a:effectRef idx="0">
-            <a:schemeClr val="accent1"/>
-          </a:effectRef>
-          <a:fontRef idx="minor">
-            <a:schemeClr val="lt1"/>
-          </a:fontRef>
-        </p:style>
-        <p:txBody>
-          <a:bodyPr wrap="none" lIns="0" tIns="20250" rIns="20250" bIns="20250" rtlCol="0" anchor="ctr"/>
-          <a:lstStyle/>
-          <a:p>
-            <a:pPr algn="ctr"/>
-            <a:r>
-              <a:rPr lang="en-US" sz="900" dirty="0"/>
-              <a:t>Temporary</a:t>
-            </a:r>
-            <a:br>
-              <a:rPr lang="en-US" sz="900" dirty="0"/>
-            </a:br>
-            <a:r>
-              <a:rPr lang="en-US" sz="900" dirty="0"/>
-              <a:t>Object</a:t>
-            </a:r>
-          </a:p>
-          <a:p>
-            <a:pPr algn="ctr"/>
-            <a:r>
-              <a:rPr lang="en-US" sz="900" dirty="0"/>
-              <a:t>Storage</a:t>
-            </a:r>
-          </a:p>
-        </p:txBody>
-      </p:sp>
-      <p:sp>
-        <p:nvSpPr>
-          <p:cNvPr id="17" name="Flowchart: Process 16">
-            <a:extLst>
-              <a:ext uri="{FF2B5EF4-FFF2-40B4-BE49-F238E27FC236}">
-                <a16:creationId xmlns:a16="http://schemas.microsoft.com/office/drawing/2014/main" id="{82E147EE-86F9-4573-8FC3-438226423CD2}"/>
-              </a:ext>
-            </a:extLst>
-          </p:cNvPr>
-          <p:cNvSpPr/>
-          <p:nvPr/>
-        </p:nvSpPr>
-        <p:spPr>
-          <a:xfrm>
-            <a:off x="2729422" y="4484088"/>
-            <a:ext cx="708750" cy="324000"/>
-          </a:xfrm>
-          <a:prstGeom prst="flowChartProcess">
-            <a:avLst/>
-          </a:prstGeom>
-        </p:spPr>
-        <p:style>
-          <a:lnRef idx="2">
-            <a:schemeClr val="accent1">
-              <a:shade val="50000"/>
-            </a:schemeClr>
-          </a:lnRef>
-          <a:fillRef idx="1">
-            <a:schemeClr val="accent1"/>
-          </a:fillRef>
-          <a:effectRef idx="0">
-            <a:schemeClr val="accent1"/>
-          </a:effectRef>
-          <a:fontRef idx="minor">
-            <a:schemeClr val="lt1"/>
-          </a:fontRef>
-        </p:style>
-        <p:txBody>
-          <a:bodyPr rot="0" spcFirstLastPara="0" vertOverflow="overflow" horzOverflow="overflow" vert="horz" wrap="square" lIns="20250" tIns="20250" rIns="20250" bIns="20250" numCol="1" spcCol="0" rtlCol="0" fromWordArt="0" anchor="ctr" anchorCtr="0" forceAA="0" compatLnSpc="1">
-            <a:prstTxWarp prst="textNoShape">
-              <a:avLst/>
-            </a:prstTxWarp>
-            <a:noAutofit/>
-          </a:bodyPr>
-          <a:lstStyle/>
-          <a:p>
-            <a:pPr algn="ctr"/>
-            <a:r>
-              <a:rPr lang="en-US" sz="900" dirty="0"/>
-              <a:t>Object Manager</a:t>
-            </a:r>
-          </a:p>
-        </p:txBody>
-      </p:sp>
-      <p:sp>
-        <p:nvSpPr>
-          <p:cNvPr id="16" name="Flowchart: Process 15">
-            <a:extLst>
-              <a:ext uri="{FF2B5EF4-FFF2-40B4-BE49-F238E27FC236}">
-                <a16:creationId xmlns:a16="http://schemas.microsoft.com/office/drawing/2014/main" id="{892ED1EB-F529-42DE-A754-6C4188E6A453}"/>
-              </a:ext>
-            </a:extLst>
-          </p:cNvPr>
-          <p:cNvSpPr/>
-          <p:nvPr/>
-        </p:nvSpPr>
-        <p:spPr>
-          <a:xfrm>
-            <a:off x="1766552" y="5388402"/>
-            <a:ext cx="708750" cy="324000"/>
-          </a:xfrm>
-          <a:prstGeom prst="flowChartProcess">
-            <a:avLst/>
-          </a:prstGeom>
-        </p:spPr>
-        <p:style>
-          <a:lnRef idx="2">
-            <a:schemeClr val="accent1">
-              <a:shade val="50000"/>
-            </a:schemeClr>
-          </a:lnRef>
-          <a:fillRef idx="1">
-            <a:schemeClr val="accent1"/>
-          </a:fillRef>
-          <a:effectRef idx="0">
-            <a:schemeClr val="accent1"/>
-          </a:effectRef>
-          <a:fontRef idx="minor">
-            <a:schemeClr val="lt1"/>
-          </a:fontRef>
-        </p:style>
-        <p:txBody>
-          <a:bodyPr rot="0" spcFirstLastPara="0" vertOverflow="overflow" horzOverflow="overflow" vert="horz" wrap="square" lIns="20250" tIns="20250" rIns="20250" bIns="20250" numCol="1" spcCol="0" rtlCol="0" fromWordArt="0" anchor="ctr" anchorCtr="0" forceAA="0" compatLnSpc="1">
-            <a:prstTxWarp prst="textNoShape">
-              <a:avLst/>
-            </a:prstTxWarp>
-            <a:noAutofit/>
-          </a:bodyPr>
-          <a:lstStyle/>
-          <a:p>
-            <a:pPr algn="ctr"/>
-            <a:r>
-              <a:rPr lang="en-US" sz="900" dirty="0"/>
-              <a:t>Mendix Client API</a:t>
-            </a:r>
-          </a:p>
-        </p:txBody>
-      </p:sp>
-      <p:sp>
-        <p:nvSpPr>
-          <p:cNvPr id="18" name="Flowchart: Process 17">
-            <a:extLst>
-              <a:ext uri="{FF2B5EF4-FFF2-40B4-BE49-F238E27FC236}">
-                <a16:creationId xmlns:a16="http://schemas.microsoft.com/office/drawing/2014/main" id="{02A358D3-9F23-4214-8111-450F72EFA729}"/>
-              </a:ext>
-            </a:extLst>
-          </p:cNvPr>
-          <p:cNvSpPr/>
-          <p:nvPr/>
-        </p:nvSpPr>
-        <p:spPr>
-          <a:xfrm>
-            <a:off x="3621732" y="5388402"/>
-            <a:ext cx="708750" cy="324000"/>
-          </a:xfrm>
-          <a:prstGeom prst="flowChartProcess">
-            <a:avLst/>
-          </a:prstGeom>
-        </p:spPr>
-        <p:style>
-          <a:lnRef idx="2">
-            <a:schemeClr val="accent1">
-              <a:shade val="50000"/>
-            </a:schemeClr>
-          </a:lnRef>
-          <a:fillRef idx="1">
-            <a:schemeClr val="accent1"/>
-          </a:fillRef>
-          <a:effectRef idx="0">
-            <a:schemeClr val="accent1"/>
-          </a:effectRef>
-          <a:fontRef idx="minor">
-            <a:schemeClr val="lt1"/>
-          </a:fontRef>
-        </p:style>
-        <p:txBody>
-          <a:bodyPr rot="0" spcFirstLastPara="0" vertOverflow="overflow" horzOverflow="overflow" vert="horz" wrap="square" lIns="20250" tIns="20250" rIns="20250" bIns="20250" numCol="1" spcCol="0" rtlCol="0" fromWordArt="0" anchor="ctr" anchorCtr="0" forceAA="0" compatLnSpc="1">
-            <a:prstTxWarp prst="textNoShape">
-              <a:avLst/>
-            </a:prstTxWarp>
-            <a:noAutofit/>
-          </a:bodyPr>
-          <a:lstStyle/>
-          <a:p>
-            <a:pPr algn="ctr"/>
-            <a:r>
-              <a:rPr lang="en-US" sz="900" dirty="0"/>
-              <a:t>Ext. Service Requests</a:t>
-            </a:r>
-          </a:p>
-        </p:txBody>
-      </p:sp>
-      <p:sp>
-        <p:nvSpPr>
-          <p:cNvPr id="19" name="Flowchart: Process 18">
-            <a:extLst>
-              <a:ext uri="{FF2B5EF4-FFF2-40B4-BE49-F238E27FC236}">
-                <a16:creationId xmlns:a16="http://schemas.microsoft.com/office/drawing/2014/main" id="{FDE32B0D-8382-41F2-9DE4-8D11CD7BA7A7}"/>
-              </a:ext>
-            </a:extLst>
-          </p:cNvPr>
-          <p:cNvSpPr/>
-          <p:nvPr/>
-        </p:nvSpPr>
-        <p:spPr>
-          <a:xfrm>
-            <a:off x="4067287" y="4024579"/>
-            <a:ext cx="708750" cy="324000"/>
-          </a:xfrm>
-          <a:prstGeom prst="flowChartProcess">
-            <a:avLst/>
-          </a:prstGeom>
-        </p:spPr>
-        <p:style>
-          <a:lnRef idx="2">
-            <a:schemeClr val="accent1">
-              <a:shade val="50000"/>
-            </a:schemeClr>
-          </a:lnRef>
-          <a:fillRef idx="1">
-            <a:schemeClr val="accent1"/>
-          </a:fillRef>
-          <a:effectRef idx="0">
-            <a:schemeClr val="accent1"/>
-          </a:effectRef>
-          <a:fontRef idx="minor">
-            <a:schemeClr val="lt1"/>
-          </a:fontRef>
-        </p:style>
-        <p:txBody>
-          <a:bodyPr rot="0" spcFirstLastPara="0" vertOverflow="overflow" horzOverflow="overflow" vert="horz" wrap="square" lIns="20250" tIns="20250" rIns="20250" bIns="20250" numCol="1" spcCol="0" rtlCol="0" fromWordArt="0" anchor="ctr" anchorCtr="0" forceAA="0" compatLnSpc="1">
-            <a:prstTxWarp prst="textNoShape">
-              <a:avLst/>
-            </a:prstTxWarp>
-            <a:noAutofit/>
-          </a:bodyPr>
-          <a:lstStyle/>
-          <a:p>
-            <a:pPr algn="ctr"/>
-            <a:r>
-              <a:rPr lang="en-US" sz="900" dirty="0"/>
-              <a:t>Ext. Service Calls</a:t>
-            </a:r>
-          </a:p>
-        </p:txBody>
-      </p:sp>
-      <p:sp>
-        <p:nvSpPr>
-          <p:cNvPr id="22" name="Flowchart: Process 21">
-            <a:extLst>
-              <a:ext uri="{FF2B5EF4-FFF2-40B4-BE49-F238E27FC236}">
-                <a16:creationId xmlns:a16="http://schemas.microsoft.com/office/drawing/2014/main" id="{8CA5E410-2AE7-4004-8CED-8CD3A3652278}"/>
-              </a:ext>
-            </a:extLst>
-          </p:cNvPr>
-          <p:cNvSpPr/>
-          <p:nvPr/>
-        </p:nvSpPr>
-        <p:spPr>
-          <a:xfrm>
-            <a:off x="4067287" y="4996067"/>
-            <a:ext cx="708750" cy="324000"/>
-          </a:xfrm>
-          <a:prstGeom prst="flowChartProcess">
-            <a:avLst/>
-          </a:prstGeom>
-        </p:spPr>
-        <p:style>
-          <a:lnRef idx="2">
-            <a:schemeClr val="accent1">
-              <a:shade val="50000"/>
-            </a:schemeClr>
-          </a:lnRef>
-          <a:fillRef idx="1">
-            <a:schemeClr val="accent1"/>
-          </a:fillRef>
-          <a:effectRef idx="0">
-            <a:schemeClr val="accent1"/>
-          </a:effectRef>
-          <a:fontRef idx="minor">
-            <a:schemeClr val="lt1"/>
-          </a:fontRef>
-        </p:style>
-        <p:txBody>
-          <a:bodyPr rot="0" spcFirstLastPara="0" vertOverflow="overflow" horzOverflow="overflow" vert="horz" wrap="square" lIns="20250" tIns="20250" rIns="20250" bIns="20250" numCol="1" spcCol="0" rtlCol="0" fromWordArt="0" anchor="ctr" anchorCtr="0" forceAA="0" compatLnSpc="1">
-            <a:prstTxWarp prst="textNoShape">
-              <a:avLst/>
-            </a:prstTxWarp>
-            <a:noAutofit/>
-          </a:bodyPr>
-          <a:lstStyle/>
-          <a:p>
-            <a:pPr algn="ctr"/>
-            <a:r>
-              <a:rPr lang="en-US" sz="900" dirty="0"/>
-              <a:t>Custom Java</a:t>
-            </a:r>
-          </a:p>
-        </p:txBody>
-      </p:sp>
-      <p:sp>
-        <p:nvSpPr>
-          <p:cNvPr id="23" name="Flowchart: Process 22">
-            <a:extLst>
-              <a:ext uri="{FF2B5EF4-FFF2-40B4-BE49-F238E27FC236}">
-                <a16:creationId xmlns:a16="http://schemas.microsoft.com/office/drawing/2014/main" id="{77D65C20-B388-4E9D-98D8-7621E335D71F}"/>
-              </a:ext>
-            </a:extLst>
-          </p:cNvPr>
-          <p:cNvSpPr/>
-          <p:nvPr/>
-        </p:nvSpPr>
-        <p:spPr>
-          <a:xfrm>
-            <a:off x="5433140" y="4482445"/>
-            <a:ext cx="708750" cy="324000"/>
-          </a:xfrm>
-          <a:prstGeom prst="flowChartProcess">
-            <a:avLst/>
-          </a:prstGeom>
-          <a:solidFill>
-            <a:schemeClr val="accent2">
-              <a:lumMod val="75000"/>
-            </a:schemeClr>
-          </a:solidFill>
-        </p:spPr>
-        <p:style>
-          <a:lnRef idx="2">
-            <a:schemeClr val="accent1">
-              <a:shade val="50000"/>
-            </a:schemeClr>
-          </a:lnRef>
-          <a:fillRef idx="1">
-            <a:schemeClr val="accent1"/>
-          </a:fillRef>
-          <a:effectRef idx="0">
-            <a:schemeClr val="accent1"/>
-          </a:effectRef>
-          <a:fontRef idx="minor">
-            <a:schemeClr val="lt1"/>
-          </a:fontRef>
-        </p:style>
-        <p:txBody>
-          <a:bodyPr rot="0" spcFirstLastPara="0" vertOverflow="overflow" horzOverflow="overflow" vert="horz" wrap="square" lIns="20250" tIns="20250" rIns="20250" bIns="20250" numCol="1" spcCol="0" rtlCol="0" fromWordArt="0" anchor="ctr" anchorCtr="0" forceAA="0" compatLnSpc="1">
-            <a:prstTxWarp prst="textNoShape">
-              <a:avLst/>
-            </a:prstTxWarp>
-            <a:noAutofit/>
-          </a:bodyPr>
-          <a:lstStyle/>
-          <a:p>
-            <a:pPr algn="ctr"/>
-            <a:r>
-              <a:rPr lang="en-US" sz="900" dirty="0"/>
-              <a:t>License Server</a:t>
-            </a:r>
-          </a:p>
-        </p:txBody>
-      </p:sp>
-      <p:sp>
-        <p:nvSpPr>
-          <p:cNvPr id="25" name="Flowchart: Stored Data 24">
-            <a:extLst>
-              <a:ext uri="{FF2B5EF4-FFF2-40B4-BE49-F238E27FC236}">
-                <a16:creationId xmlns:a16="http://schemas.microsoft.com/office/drawing/2014/main" id="{2EC7B372-7E94-4F7D-B815-FFD5635191A2}"/>
-              </a:ext>
-            </a:extLst>
-          </p:cNvPr>
-          <p:cNvSpPr/>
-          <p:nvPr/>
-        </p:nvSpPr>
-        <p:spPr>
-          <a:xfrm>
-            <a:off x="5433140" y="3599273"/>
-            <a:ext cx="708750" cy="320714"/>
-          </a:xfrm>
-          <a:prstGeom prst="flowChartOnlineStorage">
-            <a:avLst/>
-          </a:prstGeom>
-          <a:solidFill>
-            <a:schemeClr val="accent2">
-              <a:lumMod val="75000"/>
-            </a:schemeClr>
-          </a:solidFill>
-        </p:spPr>
-        <p:style>
-          <a:lnRef idx="2">
-            <a:schemeClr val="accent1">
-              <a:shade val="50000"/>
-            </a:schemeClr>
-          </a:lnRef>
-          <a:fillRef idx="1">
-            <a:schemeClr val="accent1"/>
-          </a:fillRef>
-          <a:effectRef idx="0">
-            <a:schemeClr val="accent1"/>
-          </a:effectRef>
-          <a:fontRef idx="minor">
-            <a:schemeClr val="lt1"/>
-          </a:fontRef>
-        </p:style>
-        <p:txBody>
-          <a:bodyPr lIns="0" tIns="20250" rIns="60750" bIns="20250" rtlCol="0" anchor="ctr"/>
-          <a:lstStyle/>
-          <a:p>
-            <a:pPr algn="ctr"/>
-            <a:r>
-              <a:rPr lang="en-US" sz="900" dirty="0" err="1"/>
-              <a:t>FIle</a:t>
-            </a:r>
-            <a:r>
-              <a:rPr lang="en-US" sz="900" dirty="0"/>
-              <a:t> Storage</a:t>
-            </a:r>
-          </a:p>
-        </p:txBody>
-      </p:sp>
-      <p:sp>
-        <p:nvSpPr>
-          <p:cNvPr id="26" name="Flowchart: Process 25">
-            <a:extLst>
-              <a:ext uri="{FF2B5EF4-FFF2-40B4-BE49-F238E27FC236}">
-                <a16:creationId xmlns:a16="http://schemas.microsoft.com/office/drawing/2014/main" id="{30A0718B-F61E-42B0-BAB2-0C4B0856BFC5}"/>
-              </a:ext>
-            </a:extLst>
-          </p:cNvPr>
-          <p:cNvSpPr/>
-          <p:nvPr/>
-        </p:nvSpPr>
-        <p:spPr>
-          <a:xfrm>
-            <a:off x="2729422" y="6005024"/>
-            <a:ext cx="708750" cy="324000"/>
-          </a:xfrm>
-          <a:prstGeom prst="flowChartProcess">
-            <a:avLst/>
-          </a:prstGeom>
-          <a:solidFill>
-            <a:schemeClr val="accent2">
-              <a:lumMod val="75000"/>
-            </a:schemeClr>
-          </a:solidFill>
-        </p:spPr>
-        <p:style>
-          <a:lnRef idx="2">
-            <a:schemeClr val="accent1">
-              <a:shade val="50000"/>
-            </a:schemeClr>
-          </a:lnRef>
-          <a:fillRef idx="1">
-            <a:schemeClr val="accent1"/>
-          </a:fillRef>
-          <a:effectRef idx="0">
-            <a:schemeClr val="accent1"/>
-          </a:effectRef>
-          <a:fontRef idx="minor">
-            <a:schemeClr val="lt1"/>
-          </a:fontRef>
-        </p:style>
-        <p:txBody>
-          <a:bodyPr rot="0" spcFirstLastPara="0" vertOverflow="overflow" horzOverflow="overflow" vert="horz" wrap="square" lIns="20250" tIns="20250" rIns="20250" bIns="20250" numCol="1" spcCol="0" rtlCol="0" fromWordArt="0" anchor="ctr" anchorCtr="0" forceAA="0" compatLnSpc="1">
-            <a:prstTxWarp prst="textNoShape">
-              <a:avLst/>
-            </a:prstTxWarp>
-            <a:noAutofit/>
-          </a:bodyPr>
-          <a:lstStyle/>
-          <a:p>
-            <a:pPr algn="ctr"/>
-            <a:r>
-              <a:rPr lang="en-US" sz="900" dirty="0"/>
-              <a:t>HTTPS Server</a:t>
-            </a:r>
-          </a:p>
-        </p:txBody>
-      </p:sp>
-      <p:cxnSp>
-        <p:nvCxnSpPr>
-          <p:cNvPr id="28" name="Connector: Elbow 9">
-            <a:extLst>
-              <a:ext uri="{FF2B5EF4-FFF2-40B4-BE49-F238E27FC236}">
-                <a16:creationId xmlns:a16="http://schemas.microsoft.com/office/drawing/2014/main" id="{7DFB0703-6E9A-4BE0-9657-CCB56A54F5D4}"/>
-              </a:ext>
-            </a:extLst>
-          </p:cNvPr>
-          <p:cNvCxnSpPr>
-            <a:cxnSpLocks/>
-            <a:stCxn id="3" idx="4"/>
-            <a:endCxn id="5" idx="1"/>
-          </p:cNvCxnSpPr>
-          <p:nvPr/>
-        </p:nvCxnSpPr>
-        <p:spPr>
-          <a:xfrm flipV="1">
-            <a:off x="1429575" y="4646089"/>
-            <a:ext cx="336977" cy="1"/>
-          </a:xfrm>
-          <a:prstGeom prst="straightConnector1">
-            <a:avLst/>
-          </a:prstGeom>
-          <a:ln w="22225">
-            <a:headEnd type="triangle" w="lg" len="lg"/>
-            <a:tailEnd type="triangle" w="lg" len="lg"/>
-          </a:ln>
-        </p:spPr>
-        <p:style>
-          <a:lnRef idx="1">
-            <a:schemeClr val="accent1"/>
-          </a:lnRef>
-          <a:fillRef idx="0">
-            <a:schemeClr val="accent1"/>
-          </a:fillRef>
-          <a:effectRef idx="0">
-            <a:schemeClr val="accent1"/>
-          </a:effectRef>
-          <a:fontRef idx="minor">
-            <a:schemeClr val="tx1"/>
-          </a:fontRef>
-        </p:style>
-      </p:cxnSp>
-      <p:cxnSp>
-        <p:nvCxnSpPr>
-          <p:cNvPr id="29" name="Connector: Elbow 9">
-            <a:extLst>
-              <a:ext uri="{FF2B5EF4-FFF2-40B4-BE49-F238E27FC236}">
-                <a16:creationId xmlns:a16="http://schemas.microsoft.com/office/drawing/2014/main" id="{6083B77D-E6EC-4C0A-A217-75F0637EC19E}"/>
-              </a:ext>
-            </a:extLst>
-          </p:cNvPr>
-          <p:cNvCxnSpPr>
-            <a:cxnSpLocks/>
-            <a:stCxn id="17" idx="1"/>
-            <a:endCxn id="5" idx="3"/>
-          </p:cNvCxnSpPr>
-          <p:nvPr/>
-        </p:nvCxnSpPr>
-        <p:spPr>
-          <a:xfrm flipH="1">
-            <a:off x="2475304" y="4646089"/>
-            <a:ext cx="254120" cy="1"/>
-          </a:xfrm>
-          <a:prstGeom prst="straightConnector1">
-            <a:avLst/>
-          </a:prstGeom>
-          <a:ln w="22225">
-            <a:headEnd type="triangle" w="lg" len="lg"/>
-            <a:tailEnd type="triangle" w="lg" len="lg"/>
-          </a:ln>
-        </p:spPr>
-        <p:style>
-          <a:lnRef idx="1">
-            <a:schemeClr val="accent1"/>
-          </a:lnRef>
-          <a:fillRef idx="0">
-            <a:schemeClr val="accent1"/>
-          </a:fillRef>
-          <a:effectRef idx="0">
-            <a:schemeClr val="accent1"/>
-          </a:effectRef>
-          <a:fontRef idx="minor">
-            <a:schemeClr val="tx1"/>
-          </a:fontRef>
-        </p:style>
-      </p:cxnSp>
-      <p:cxnSp>
-        <p:nvCxnSpPr>
-          <p:cNvPr id="31" name="Connector: Elbow 9">
-            <a:extLst>
-              <a:ext uri="{FF2B5EF4-FFF2-40B4-BE49-F238E27FC236}">
-                <a16:creationId xmlns:a16="http://schemas.microsoft.com/office/drawing/2014/main" id="{B5FC3CF7-D51E-402B-BAA8-50401D61D74E}"/>
-              </a:ext>
-            </a:extLst>
-          </p:cNvPr>
-          <p:cNvCxnSpPr>
-            <a:cxnSpLocks/>
-            <a:stCxn id="17" idx="0"/>
-            <a:endCxn id="15" idx="2"/>
-          </p:cNvCxnSpPr>
-          <p:nvPr/>
-        </p:nvCxnSpPr>
-        <p:spPr>
-          <a:xfrm flipV="1">
-            <a:off x="3083797" y="3947306"/>
-            <a:ext cx="1" cy="536781"/>
-          </a:xfrm>
-          <a:prstGeom prst="straightConnector1">
-            <a:avLst/>
-          </a:prstGeom>
-          <a:ln w="22225">
-            <a:headEnd type="triangle" w="lg" len="lg"/>
-            <a:tailEnd type="triangle" w="lg" len="lg"/>
-          </a:ln>
-        </p:spPr>
-        <p:style>
-          <a:lnRef idx="1">
-            <a:schemeClr val="accent1"/>
-          </a:lnRef>
-          <a:fillRef idx="0">
-            <a:schemeClr val="accent1"/>
-          </a:fillRef>
-          <a:effectRef idx="0">
-            <a:schemeClr val="accent1"/>
-          </a:effectRef>
-          <a:fontRef idx="minor">
-            <a:schemeClr val="tx1"/>
-          </a:fontRef>
-        </p:style>
-      </p:cxnSp>
-      <p:cxnSp>
-        <p:nvCxnSpPr>
-          <p:cNvPr id="34" name="Connector: Elbow 9">
-            <a:extLst>
-              <a:ext uri="{FF2B5EF4-FFF2-40B4-BE49-F238E27FC236}">
-                <a16:creationId xmlns:a16="http://schemas.microsoft.com/office/drawing/2014/main" id="{C1A88CD9-2DF1-48CB-9C97-446E7F1597BC}"/>
-              </a:ext>
-            </a:extLst>
-          </p:cNvPr>
-          <p:cNvCxnSpPr>
-            <a:cxnSpLocks/>
-            <a:stCxn id="17" idx="0"/>
-            <a:endCxn id="6" idx="2"/>
-          </p:cNvCxnSpPr>
-          <p:nvPr/>
-        </p:nvCxnSpPr>
-        <p:spPr>
-          <a:xfrm flipV="1">
-            <a:off x="3083798" y="3923273"/>
-            <a:ext cx="892310" cy="560815"/>
-          </a:xfrm>
-          <a:prstGeom prst="straightConnector1">
-            <a:avLst/>
-          </a:prstGeom>
-          <a:ln w="22225">
-            <a:headEnd type="triangle" w="lg" len="lg"/>
-            <a:tailEnd type="triangle" w="lg" len="lg"/>
-          </a:ln>
-        </p:spPr>
-        <p:style>
-          <a:lnRef idx="1">
-            <a:schemeClr val="accent1"/>
-          </a:lnRef>
-          <a:fillRef idx="0">
-            <a:schemeClr val="accent1"/>
-          </a:fillRef>
-          <a:effectRef idx="0">
-            <a:schemeClr val="accent1"/>
-          </a:effectRef>
-          <a:fontRef idx="minor">
-            <a:schemeClr val="tx1"/>
-          </a:fontRef>
-        </p:style>
-      </p:cxnSp>
-      <p:cxnSp>
-        <p:nvCxnSpPr>
-          <p:cNvPr id="40" name="Connector: Elbow 9">
-            <a:extLst>
-              <a:ext uri="{FF2B5EF4-FFF2-40B4-BE49-F238E27FC236}">
-                <a16:creationId xmlns:a16="http://schemas.microsoft.com/office/drawing/2014/main" id="{97795F93-18D8-4CCB-9F07-EC1A2E543C8D}"/>
-              </a:ext>
-            </a:extLst>
-          </p:cNvPr>
-          <p:cNvCxnSpPr>
-            <a:cxnSpLocks/>
-            <a:stCxn id="4" idx="1"/>
-            <a:endCxn id="3" idx="1"/>
-          </p:cNvCxnSpPr>
-          <p:nvPr/>
-        </p:nvCxnSpPr>
-        <p:spPr>
-          <a:xfrm flipH="1">
-            <a:off x="1075201" y="4186580"/>
-            <a:ext cx="654746" cy="244112"/>
-          </a:xfrm>
-          <a:prstGeom prst="straightConnector1">
-            <a:avLst/>
-          </a:prstGeom>
-          <a:ln w="22225">
-            <a:headEnd type="triangle" w="lg" len="lg"/>
-            <a:tailEnd type="triangle" w="lg" len="lg"/>
-          </a:ln>
-        </p:spPr>
-        <p:style>
-          <a:lnRef idx="1">
-            <a:schemeClr val="accent1"/>
-          </a:lnRef>
-          <a:fillRef idx="0">
-            <a:schemeClr val="accent1"/>
-          </a:fillRef>
-          <a:effectRef idx="0">
-            <a:schemeClr val="accent1"/>
-          </a:effectRef>
-          <a:fontRef idx="minor">
-            <a:schemeClr val="tx1"/>
-          </a:fontRef>
-        </p:style>
-      </p:cxnSp>
-      <p:cxnSp>
-        <p:nvCxnSpPr>
-          <p:cNvPr id="46" name="Connector: Elbow 9">
-            <a:extLst>
-              <a:ext uri="{FF2B5EF4-FFF2-40B4-BE49-F238E27FC236}">
-                <a16:creationId xmlns:a16="http://schemas.microsoft.com/office/drawing/2014/main" id="{0AB2B316-7E66-4FF5-9D59-3FEC17FE0401}"/>
-              </a:ext>
-            </a:extLst>
-          </p:cNvPr>
-          <p:cNvCxnSpPr>
-            <a:cxnSpLocks/>
-            <a:stCxn id="16" idx="0"/>
-            <a:endCxn id="17" idx="2"/>
-          </p:cNvCxnSpPr>
-          <p:nvPr/>
-        </p:nvCxnSpPr>
-        <p:spPr>
-          <a:xfrm flipV="1">
-            <a:off x="2120927" y="4808088"/>
-            <a:ext cx="962870" cy="580314"/>
-          </a:xfrm>
-          <a:prstGeom prst="straightConnector1">
-            <a:avLst/>
-          </a:prstGeom>
-          <a:ln w="22225">
-            <a:headEnd type="triangle" w="lg" len="lg"/>
-            <a:tailEnd type="triangle" w="lg" len="lg"/>
-          </a:ln>
-        </p:spPr>
-        <p:style>
-          <a:lnRef idx="1">
-            <a:schemeClr val="accent1"/>
-          </a:lnRef>
-          <a:fillRef idx="0">
-            <a:schemeClr val="accent1"/>
-          </a:fillRef>
-          <a:effectRef idx="0">
-            <a:schemeClr val="accent1"/>
-          </a:effectRef>
-          <a:fontRef idx="minor">
-            <a:schemeClr val="tx1"/>
-          </a:fontRef>
-        </p:style>
-      </p:cxnSp>
-      <p:cxnSp>
-        <p:nvCxnSpPr>
-          <p:cNvPr id="49" name="Connector: Elbow 9">
-            <a:extLst>
-              <a:ext uri="{FF2B5EF4-FFF2-40B4-BE49-F238E27FC236}">
-                <a16:creationId xmlns:a16="http://schemas.microsoft.com/office/drawing/2014/main" id="{3F50EFD5-13CF-4F0A-9C74-888AA8077FAE}"/>
-              </a:ext>
-            </a:extLst>
-          </p:cNvPr>
-          <p:cNvCxnSpPr>
-            <a:cxnSpLocks/>
-            <a:stCxn id="18" idx="0"/>
-            <a:endCxn id="17" idx="2"/>
-          </p:cNvCxnSpPr>
-          <p:nvPr/>
-        </p:nvCxnSpPr>
-        <p:spPr>
-          <a:xfrm flipH="1" flipV="1">
-            <a:off x="3083798" y="4808088"/>
-            <a:ext cx="892310" cy="580314"/>
-          </a:xfrm>
-          <a:prstGeom prst="straightConnector1">
-            <a:avLst/>
-          </a:prstGeom>
-          <a:ln w="22225">
-            <a:headEnd type="triangle" w="lg" len="lg"/>
-            <a:tailEnd type="triangle" w="lg" len="lg"/>
-          </a:ln>
-        </p:spPr>
-        <p:style>
-          <a:lnRef idx="1">
-            <a:schemeClr val="accent1"/>
-          </a:lnRef>
-          <a:fillRef idx="0">
-            <a:schemeClr val="accent1"/>
-          </a:fillRef>
-          <a:effectRef idx="0">
-            <a:schemeClr val="accent1"/>
-          </a:effectRef>
-          <a:fontRef idx="minor">
-            <a:schemeClr val="tx1"/>
-          </a:fontRef>
-        </p:style>
-      </p:cxnSp>
-      <p:cxnSp>
-        <p:nvCxnSpPr>
-          <p:cNvPr id="52" name="Connector: Elbow 9">
-            <a:extLst>
-              <a:ext uri="{FF2B5EF4-FFF2-40B4-BE49-F238E27FC236}">
-                <a16:creationId xmlns:a16="http://schemas.microsoft.com/office/drawing/2014/main" id="{72D69EDF-6897-4CC4-9029-34294E4762AC}"/>
-              </a:ext>
-            </a:extLst>
-          </p:cNvPr>
-          <p:cNvCxnSpPr>
-            <a:cxnSpLocks/>
-            <a:stCxn id="19" idx="1"/>
-            <a:endCxn id="17" idx="0"/>
-          </p:cNvCxnSpPr>
-          <p:nvPr/>
-        </p:nvCxnSpPr>
-        <p:spPr>
-          <a:xfrm flipH="1">
-            <a:off x="3083799" y="4186579"/>
-            <a:ext cx="983490" cy="297509"/>
-          </a:xfrm>
-          <a:prstGeom prst="straightConnector1">
-            <a:avLst/>
-          </a:prstGeom>
-          <a:ln w="22225">
-            <a:headEnd type="triangle" w="lg" len="lg"/>
-            <a:tailEnd type="triangle" w="lg" len="lg"/>
-          </a:ln>
-        </p:spPr>
-        <p:style>
-          <a:lnRef idx="1">
-            <a:schemeClr val="accent1"/>
-          </a:lnRef>
-          <a:fillRef idx="0">
-            <a:schemeClr val="accent1"/>
-          </a:fillRef>
-          <a:effectRef idx="0">
-            <a:schemeClr val="accent1"/>
-          </a:effectRef>
-          <a:fontRef idx="minor">
-            <a:schemeClr val="tx1"/>
-          </a:fontRef>
-        </p:style>
-      </p:cxnSp>
-      <p:cxnSp>
-        <p:nvCxnSpPr>
-          <p:cNvPr id="55" name="Connector: Elbow 9">
-            <a:extLst>
-              <a:ext uri="{FF2B5EF4-FFF2-40B4-BE49-F238E27FC236}">
-                <a16:creationId xmlns:a16="http://schemas.microsoft.com/office/drawing/2014/main" id="{17FB004F-237D-475A-A2B6-87B51A8F99A9}"/>
-              </a:ext>
-            </a:extLst>
-          </p:cNvPr>
-          <p:cNvCxnSpPr>
-            <a:cxnSpLocks/>
-            <a:stCxn id="18" idx="0"/>
-            <a:endCxn id="9" idx="2"/>
-          </p:cNvCxnSpPr>
-          <p:nvPr/>
-        </p:nvCxnSpPr>
-        <p:spPr>
-          <a:xfrm flipV="1">
-            <a:off x="3976107" y="4808090"/>
-            <a:ext cx="1847" cy="580314"/>
-          </a:xfrm>
-          <a:prstGeom prst="straightConnector1">
-            <a:avLst/>
-          </a:prstGeom>
-          <a:ln w="22225">
-            <a:headEnd type="triangle" w="lg" len="lg"/>
-            <a:tailEnd type="triangle" w="lg" len="lg"/>
-          </a:ln>
-        </p:spPr>
-        <p:style>
-          <a:lnRef idx="1">
-            <a:schemeClr val="accent1"/>
-          </a:lnRef>
-          <a:fillRef idx="0">
-            <a:schemeClr val="accent1"/>
-          </a:fillRef>
-          <a:effectRef idx="0">
-            <a:schemeClr val="accent1"/>
-          </a:effectRef>
-          <a:fontRef idx="minor">
-            <a:schemeClr val="tx1"/>
-          </a:fontRef>
-        </p:style>
-      </p:cxnSp>
-      <p:cxnSp>
-        <p:nvCxnSpPr>
-          <p:cNvPr id="58" name="Connector: Elbow 9">
-            <a:extLst>
-              <a:ext uri="{FF2B5EF4-FFF2-40B4-BE49-F238E27FC236}">
-                <a16:creationId xmlns:a16="http://schemas.microsoft.com/office/drawing/2014/main" id="{D61AFBBC-48D5-41FA-A8CB-1BAC6F6530AC}"/>
-              </a:ext>
-            </a:extLst>
-          </p:cNvPr>
-          <p:cNvCxnSpPr>
-            <a:cxnSpLocks/>
-            <a:stCxn id="19" idx="2"/>
-            <a:endCxn id="9" idx="0"/>
-          </p:cNvCxnSpPr>
-          <p:nvPr/>
-        </p:nvCxnSpPr>
-        <p:spPr>
-          <a:xfrm flipH="1">
-            <a:off x="3977954" y="4348581"/>
-            <a:ext cx="443708" cy="135509"/>
-          </a:xfrm>
-          <a:prstGeom prst="straightConnector1">
-            <a:avLst/>
-          </a:prstGeom>
-          <a:ln w="22225">
-            <a:headEnd type="triangle" w="lg" len="lg"/>
-            <a:tailEnd type="triangle" w="lg" len="lg"/>
-          </a:ln>
-        </p:spPr>
-        <p:style>
-          <a:lnRef idx="1">
-            <a:schemeClr val="accent1"/>
-          </a:lnRef>
-          <a:fillRef idx="0">
-            <a:schemeClr val="accent1"/>
-          </a:fillRef>
-          <a:effectRef idx="0">
-            <a:schemeClr val="accent1"/>
-          </a:effectRef>
-          <a:fontRef idx="minor">
-            <a:schemeClr val="tx1"/>
-          </a:fontRef>
-        </p:style>
-      </p:cxnSp>
-      <p:cxnSp>
-        <p:nvCxnSpPr>
-          <p:cNvPr id="62" name="Connector: Elbow 9">
-            <a:extLst>
-              <a:ext uri="{FF2B5EF4-FFF2-40B4-BE49-F238E27FC236}">
-                <a16:creationId xmlns:a16="http://schemas.microsoft.com/office/drawing/2014/main" id="{B1C316E6-577A-4605-A6A4-CD40C91157D5}"/>
-              </a:ext>
-            </a:extLst>
-          </p:cNvPr>
-          <p:cNvCxnSpPr>
-            <a:cxnSpLocks/>
-            <a:stCxn id="19" idx="2"/>
-            <a:endCxn id="22" idx="0"/>
-          </p:cNvCxnSpPr>
-          <p:nvPr/>
-        </p:nvCxnSpPr>
-        <p:spPr>
-          <a:xfrm>
-            <a:off x="4421662" y="4348580"/>
-            <a:ext cx="0" cy="647488"/>
-          </a:xfrm>
-          <a:prstGeom prst="straightConnector1">
-            <a:avLst/>
-          </a:prstGeom>
-          <a:ln w="22225">
-            <a:headEnd type="triangle" w="lg" len="lg"/>
-            <a:tailEnd type="triangle" w="lg" len="lg"/>
-          </a:ln>
-        </p:spPr>
-        <p:style>
-          <a:lnRef idx="1">
-            <a:schemeClr val="accent1"/>
-          </a:lnRef>
-          <a:fillRef idx="0">
-            <a:schemeClr val="accent1"/>
-          </a:fillRef>
-          <a:effectRef idx="0">
-            <a:schemeClr val="accent1"/>
-          </a:effectRef>
-          <a:fontRef idx="minor">
-            <a:schemeClr val="tx1"/>
-          </a:fontRef>
-        </p:style>
-      </p:cxnSp>
-      <p:cxnSp>
-        <p:nvCxnSpPr>
-          <p:cNvPr id="81" name="Connector: Elbow 9">
-            <a:extLst>
-              <a:ext uri="{FF2B5EF4-FFF2-40B4-BE49-F238E27FC236}">
-                <a16:creationId xmlns:a16="http://schemas.microsoft.com/office/drawing/2014/main" id="{754C33D1-0600-4FF3-9725-F96655A73A7A}"/>
-              </a:ext>
-            </a:extLst>
-          </p:cNvPr>
-          <p:cNvCxnSpPr>
-            <a:cxnSpLocks/>
-            <a:stCxn id="22" idx="0"/>
-            <a:endCxn id="9" idx="2"/>
-          </p:cNvCxnSpPr>
-          <p:nvPr/>
-        </p:nvCxnSpPr>
-        <p:spPr>
-          <a:xfrm flipH="1" flipV="1">
-            <a:off x="3977954" y="4808089"/>
-            <a:ext cx="443708" cy="187979"/>
-          </a:xfrm>
-          <a:prstGeom prst="straightConnector1">
-            <a:avLst/>
-          </a:prstGeom>
-          <a:ln w="22225">
-            <a:headEnd type="triangle" w="lg" len="lg"/>
-            <a:tailEnd type="triangle" w="lg" len="lg"/>
-          </a:ln>
-        </p:spPr>
-        <p:style>
-          <a:lnRef idx="1">
-            <a:schemeClr val="accent1"/>
-          </a:lnRef>
-          <a:fillRef idx="0">
-            <a:schemeClr val="accent1"/>
-          </a:fillRef>
-          <a:effectRef idx="0">
-            <a:schemeClr val="accent1"/>
-          </a:effectRef>
-          <a:fontRef idx="minor">
-            <a:schemeClr val="tx1"/>
-          </a:fontRef>
-        </p:style>
-      </p:cxnSp>
-      <p:cxnSp>
-        <p:nvCxnSpPr>
-          <p:cNvPr id="84" name="Connector: Elbow 9">
-            <a:extLst>
-              <a:ext uri="{FF2B5EF4-FFF2-40B4-BE49-F238E27FC236}">
-                <a16:creationId xmlns:a16="http://schemas.microsoft.com/office/drawing/2014/main" id="{6218ABB9-EBA1-4A29-A60B-23458DD1473E}"/>
-              </a:ext>
-            </a:extLst>
-          </p:cNvPr>
-          <p:cNvCxnSpPr>
-            <a:cxnSpLocks/>
-            <a:stCxn id="9" idx="1"/>
-            <a:endCxn id="17" idx="3"/>
-          </p:cNvCxnSpPr>
-          <p:nvPr/>
-        </p:nvCxnSpPr>
-        <p:spPr>
-          <a:xfrm flipH="1" flipV="1">
-            <a:off x="3438174" y="4646089"/>
-            <a:ext cx="185407" cy="1"/>
-          </a:xfrm>
-          <a:prstGeom prst="straightConnector1">
-            <a:avLst/>
-          </a:prstGeom>
-          <a:ln w="22225">
-            <a:headEnd type="triangle" w="lg" len="lg"/>
-            <a:tailEnd type="triangle" w="lg" len="lg"/>
-          </a:ln>
-        </p:spPr>
-        <p:style>
-          <a:lnRef idx="1">
-            <a:schemeClr val="accent1"/>
-          </a:lnRef>
-          <a:fillRef idx="0">
-            <a:schemeClr val="accent1"/>
-          </a:fillRef>
-          <a:effectRef idx="0">
-            <a:schemeClr val="accent1"/>
-          </a:effectRef>
-          <a:fontRef idx="minor">
-            <a:schemeClr val="tx1"/>
-          </a:fontRef>
-        </p:style>
-      </p:cxnSp>
-      <p:cxnSp>
-        <p:nvCxnSpPr>
-          <p:cNvPr id="87" name="Connector: Elbow 9">
-            <a:extLst>
-              <a:ext uri="{FF2B5EF4-FFF2-40B4-BE49-F238E27FC236}">
-                <a16:creationId xmlns:a16="http://schemas.microsoft.com/office/drawing/2014/main" id="{4CAA8F0E-6C7E-46A7-A73B-C687CE3CEE00}"/>
-              </a:ext>
-            </a:extLst>
-          </p:cNvPr>
-          <p:cNvCxnSpPr>
-            <a:cxnSpLocks/>
-            <a:stCxn id="6" idx="3"/>
-            <a:endCxn id="25" idx="1"/>
-          </p:cNvCxnSpPr>
-          <p:nvPr/>
-        </p:nvCxnSpPr>
-        <p:spPr>
-          <a:xfrm flipV="1">
-            <a:off x="4330481" y="3759632"/>
-            <a:ext cx="1102659" cy="1643"/>
-          </a:xfrm>
-          <a:prstGeom prst="straightConnector1">
-            <a:avLst/>
-          </a:prstGeom>
-          <a:ln w="22225">
-            <a:headEnd type="triangle" w="lg" len="lg"/>
-            <a:tailEnd type="triangle" w="lg" len="lg"/>
-          </a:ln>
-        </p:spPr>
-        <p:style>
-          <a:lnRef idx="1">
-            <a:schemeClr val="accent1"/>
-          </a:lnRef>
-          <a:fillRef idx="0">
-            <a:schemeClr val="accent1"/>
-          </a:fillRef>
-          <a:effectRef idx="0">
-            <a:schemeClr val="accent1"/>
-          </a:effectRef>
-          <a:fontRef idx="minor">
-            <a:schemeClr val="tx1"/>
-          </a:fontRef>
-        </p:style>
-      </p:cxnSp>
-      <p:cxnSp>
-        <p:nvCxnSpPr>
-          <p:cNvPr id="90" name="Connector: Elbow 9">
-            <a:extLst>
-              <a:ext uri="{FF2B5EF4-FFF2-40B4-BE49-F238E27FC236}">
-                <a16:creationId xmlns:a16="http://schemas.microsoft.com/office/drawing/2014/main" id="{089FECF2-F430-4B12-B8F2-33F5F4A28B62}"/>
-              </a:ext>
-            </a:extLst>
-          </p:cNvPr>
-          <p:cNvCxnSpPr>
-            <a:cxnSpLocks/>
-            <a:stCxn id="26" idx="0"/>
-            <a:endCxn id="16" idx="2"/>
-          </p:cNvCxnSpPr>
-          <p:nvPr/>
-        </p:nvCxnSpPr>
-        <p:spPr>
-          <a:xfrm flipH="1" flipV="1">
-            <a:off x="2120927" y="5712402"/>
-            <a:ext cx="962870" cy="292622"/>
-          </a:xfrm>
-          <a:prstGeom prst="straightConnector1">
-            <a:avLst/>
-          </a:prstGeom>
-          <a:ln w="22225">
-            <a:headEnd type="triangle" w="lg" len="lg"/>
-            <a:tailEnd type="triangle" w="lg" len="lg"/>
-          </a:ln>
-        </p:spPr>
-        <p:style>
-          <a:lnRef idx="1">
-            <a:schemeClr val="accent1"/>
-          </a:lnRef>
-          <a:fillRef idx="0">
-            <a:schemeClr val="accent1"/>
-          </a:fillRef>
-          <a:effectRef idx="0">
-            <a:schemeClr val="accent1"/>
-          </a:effectRef>
-          <a:fontRef idx="minor">
-            <a:schemeClr val="tx1"/>
-          </a:fontRef>
-        </p:style>
-      </p:cxnSp>
-      <p:cxnSp>
-        <p:nvCxnSpPr>
-          <p:cNvPr id="93" name="Connector: Elbow 9">
-            <a:extLst>
-              <a:ext uri="{FF2B5EF4-FFF2-40B4-BE49-F238E27FC236}">
-                <a16:creationId xmlns:a16="http://schemas.microsoft.com/office/drawing/2014/main" id="{C9740F43-EECF-451A-9052-9205A1E2D7EA}"/>
-              </a:ext>
-            </a:extLst>
-          </p:cNvPr>
-          <p:cNvCxnSpPr>
-            <a:cxnSpLocks/>
-            <a:stCxn id="108" idx="1"/>
-            <a:endCxn id="19" idx="3"/>
-          </p:cNvCxnSpPr>
-          <p:nvPr/>
-        </p:nvCxnSpPr>
-        <p:spPr>
-          <a:xfrm flipH="1">
-            <a:off x="4776037" y="4184937"/>
-            <a:ext cx="657104" cy="1643"/>
-          </a:xfrm>
-          <a:prstGeom prst="straightConnector1">
-            <a:avLst/>
-          </a:prstGeom>
-          <a:ln w="22225">
-            <a:headEnd type="triangle" w="lg" len="lg"/>
-            <a:tailEnd type="triangle" w="lg" len="lg"/>
-          </a:ln>
-        </p:spPr>
-        <p:style>
-          <a:lnRef idx="1">
-            <a:schemeClr val="accent1"/>
-          </a:lnRef>
-          <a:fillRef idx="0">
-            <a:schemeClr val="accent1"/>
-          </a:fillRef>
-          <a:effectRef idx="0">
-            <a:schemeClr val="accent1"/>
-          </a:effectRef>
-          <a:fontRef idx="minor">
-            <a:schemeClr val="tx1"/>
-          </a:fontRef>
-        </p:style>
-      </p:cxnSp>
-      <p:cxnSp>
-        <p:nvCxnSpPr>
-          <p:cNvPr id="96" name="Connector: Elbow 9">
-            <a:extLst>
-              <a:ext uri="{FF2B5EF4-FFF2-40B4-BE49-F238E27FC236}">
-                <a16:creationId xmlns:a16="http://schemas.microsoft.com/office/drawing/2014/main" id="{DD12ED69-2A51-444A-9650-6B995E84B97C}"/>
-              </a:ext>
-            </a:extLst>
-          </p:cNvPr>
-          <p:cNvCxnSpPr>
-            <a:cxnSpLocks/>
-            <a:stCxn id="26" idx="0"/>
-            <a:endCxn id="18" idx="2"/>
-          </p:cNvCxnSpPr>
-          <p:nvPr/>
-        </p:nvCxnSpPr>
-        <p:spPr>
-          <a:xfrm flipV="1">
-            <a:off x="3083798" y="5712402"/>
-            <a:ext cx="892310" cy="292622"/>
-          </a:xfrm>
-          <a:prstGeom prst="straightConnector1">
-            <a:avLst/>
-          </a:prstGeom>
-          <a:ln w="22225">
-            <a:headEnd type="triangle" w="lg" len="lg"/>
-            <a:tailEnd type="triangle" w="lg" len="lg"/>
-          </a:ln>
-        </p:spPr>
-        <p:style>
-          <a:lnRef idx="1">
-            <a:schemeClr val="accent1"/>
-          </a:lnRef>
-          <a:fillRef idx="0">
-            <a:schemeClr val="accent1"/>
-          </a:fillRef>
-          <a:effectRef idx="0">
-            <a:schemeClr val="accent1"/>
-          </a:effectRef>
-          <a:fontRef idx="minor">
-            <a:schemeClr val="tx1"/>
-          </a:fontRef>
-        </p:style>
-      </p:cxnSp>
-      <p:cxnSp>
-        <p:nvCxnSpPr>
-          <p:cNvPr id="120" name="Connector: Elbow 9">
-            <a:extLst>
-              <a:ext uri="{FF2B5EF4-FFF2-40B4-BE49-F238E27FC236}">
-                <a16:creationId xmlns:a16="http://schemas.microsoft.com/office/drawing/2014/main" id="{87FA9E0E-D1E8-4E10-AF62-631F4D25F4B6}"/>
-              </a:ext>
-            </a:extLst>
-          </p:cNvPr>
-          <p:cNvCxnSpPr>
-            <a:cxnSpLocks/>
-            <a:stCxn id="145" idx="3"/>
-            <a:endCxn id="23" idx="1"/>
-          </p:cNvCxnSpPr>
-          <p:nvPr/>
-        </p:nvCxnSpPr>
-        <p:spPr>
-          <a:xfrm>
-            <a:off x="5273245" y="4642257"/>
-            <a:ext cx="159895" cy="2189"/>
-          </a:xfrm>
-          <a:prstGeom prst="straightConnector1">
-            <a:avLst/>
-          </a:prstGeom>
-          <a:ln w="22225">
-            <a:headEnd type="triangle" w="lg" len="lg"/>
-            <a:tailEnd type="triangle" w="lg" len="lg"/>
-          </a:ln>
-        </p:spPr>
-        <p:style>
-          <a:lnRef idx="1">
-            <a:schemeClr val="accent1"/>
-          </a:lnRef>
-          <a:fillRef idx="0">
-            <a:schemeClr val="accent1"/>
-          </a:fillRef>
-          <a:effectRef idx="0">
-            <a:schemeClr val="accent1"/>
-          </a:effectRef>
-          <a:fontRef idx="minor">
-            <a:schemeClr val="tx1"/>
-          </a:fontRef>
-        </p:style>
-      </p:cxnSp>
-      <p:cxnSp>
-        <p:nvCxnSpPr>
-          <p:cNvPr id="130" name="Connector: Elbow 9">
-            <a:extLst>
-              <a:ext uri="{FF2B5EF4-FFF2-40B4-BE49-F238E27FC236}">
-                <a16:creationId xmlns:a16="http://schemas.microsoft.com/office/drawing/2014/main" id="{085079A8-FDD0-40BF-ACE6-862DD29DBF5C}"/>
-              </a:ext>
-            </a:extLst>
-          </p:cNvPr>
-          <p:cNvCxnSpPr>
-            <a:cxnSpLocks/>
-            <a:stCxn id="17" idx="0"/>
-            <a:endCxn id="11" idx="3"/>
-          </p:cNvCxnSpPr>
-          <p:nvPr/>
-        </p:nvCxnSpPr>
-        <p:spPr>
-          <a:xfrm flipH="1" flipV="1">
-            <a:off x="2357177" y="3761273"/>
-            <a:ext cx="726620" cy="722815"/>
-          </a:xfrm>
-          <a:prstGeom prst="straightConnector1">
-            <a:avLst/>
-          </a:prstGeom>
-          <a:ln w="22225">
-            <a:headEnd type="triangle" w="lg" len="lg"/>
-            <a:tailEnd type="triangle" w="lg" len="lg"/>
-          </a:ln>
-        </p:spPr>
-        <p:style>
-          <a:lnRef idx="1">
-            <a:schemeClr val="accent1"/>
-          </a:lnRef>
-          <a:fillRef idx="0">
-            <a:schemeClr val="accent1"/>
-          </a:fillRef>
-          <a:effectRef idx="0">
-            <a:schemeClr val="accent1"/>
-          </a:effectRef>
-          <a:fontRef idx="minor">
-            <a:schemeClr val="tx1"/>
-          </a:fontRef>
-        </p:style>
-      </p:cxnSp>
-      <p:grpSp>
-        <p:nvGrpSpPr>
-          <p:cNvPr id="160" name="Label Group">
-            <a:extLst>
-              <a:ext uri="{FF2B5EF4-FFF2-40B4-BE49-F238E27FC236}">
-                <a16:creationId xmlns:a16="http://schemas.microsoft.com/office/drawing/2014/main" id="{D96537CA-2862-46AF-9B8A-443948E5C98E}"/>
-              </a:ext>
-            </a:extLst>
-          </p:cNvPr>
-          <p:cNvGrpSpPr/>
-          <p:nvPr/>
-        </p:nvGrpSpPr>
-        <p:grpSpPr>
-          <a:xfrm>
-            <a:off x="950046" y="5984328"/>
-            <a:ext cx="978718" cy="700778"/>
-            <a:chOff x="620111" y="5262471"/>
-            <a:chExt cx="1739943" cy="1245827"/>
-          </a:xfrm>
-        </p:grpSpPr>
-        <p:cxnSp>
-          <p:nvCxnSpPr>
-            <p:cNvPr id="133" name="Connector: Elbow 9">
-              <a:extLst>
-                <a:ext uri="{FF2B5EF4-FFF2-40B4-BE49-F238E27FC236}">
-                  <a16:creationId xmlns:a16="http://schemas.microsoft.com/office/drawing/2014/main" id="{AED474F7-4B48-4E6A-B96E-E27876D14815}"/>
-                </a:ext>
-              </a:extLst>
-            </p:cNvPr>
-            <p:cNvCxnSpPr>
-              <a:cxnSpLocks/>
-            </p:cNvCxnSpPr>
-            <p:nvPr/>
-          </p:nvCxnSpPr>
-          <p:spPr>
-            <a:xfrm flipH="1">
-              <a:off x="798262" y="5462467"/>
-              <a:ext cx="387174" cy="0"/>
-            </a:xfrm>
-            <a:prstGeom prst="straightConnector1">
-              <a:avLst/>
-            </a:prstGeom>
-            <a:ln w="22225">
-              <a:headEnd type="triangle" w="lg" len="lg"/>
-              <a:tailEnd type="triangle" w="lg" len="lg"/>
-            </a:ln>
-          </p:spPr>
-          <p:style>
-            <a:lnRef idx="1">
-              <a:schemeClr val="accent1"/>
-            </a:lnRef>
-            <a:fillRef idx="0">
-              <a:schemeClr val="accent1"/>
-            </a:fillRef>
-            <a:effectRef idx="0">
-              <a:schemeClr val="accent1"/>
-            </a:effectRef>
-            <a:fontRef idx="minor">
-              <a:schemeClr val="tx1"/>
-            </a:fontRef>
-          </p:style>
-        </p:cxnSp>
-        <p:sp>
-          <p:nvSpPr>
-            <p:cNvPr id="141" name="Flowchart: Process 140">
-              <a:extLst>
-                <a:ext uri="{FF2B5EF4-FFF2-40B4-BE49-F238E27FC236}">
-                  <a16:creationId xmlns:a16="http://schemas.microsoft.com/office/drawing/2014/main" id="{9CBAA33C-44A4-479A-A0B2-3AA852009BE0}"/>
-                </a:ext>
-              </a:extLst>
-            </p:cNvPr>
-            <p:cNvSpPr/>
-            <p:nvPr/>
-          </p:nvSpPr>
-          <p:spPr>
-            <a:xfrm>
-              <a:off x="798262" y="5685603"/>
-              <a:ext cx="753638" cy="235196"/>
-            </a:xfrm>
-            <a:prstGeom prst="flowChartProcess">
-              <a:avLst/>
-            </a:prstGeom>
-            <a:solidFill>
-              <a:schemeClr val="accent2">
-                <a:lumMod val="75000"/>
-              </a:schemeClr>
-            </a:solidFill>
-          </p:spPr>
-          <p:style>
-            <a:lnRef idx="2">
-              <a:schemeClr val="accent1">
-                <a:shade val="50000"/>
-              </a:schemeClr>
-            </a:lnRef>
-            <a:fillRef idx="1">
-              <a:schemeClr val="accent1"/>
-            </a:fillRef>
-            <a:effectRef idx="0">
-              <a:schemeClr val="accent1"/>
-            </a:effectRef>
-            <a:fontRef idx="minor">
-              <a:schemeClr val="lt1"/>
-            </a:fontRef>
-          </p:style>
-          <p:txBody>
-            <a:bodyPr rot="0" spcFirstLastPara="0" vertOverflow="overflow" horzOverflow="overflow" vert="horz" wrap="square" lIns="20250" tIns="20250" rIns="20250" bIns="20250" numCol="1" spcCol="0" rtlCol="0" fromWordArt="0" anchor="ctr" anchorCtr="0" forceAA="0" compatLnSpc="1">
-              <a:prstTxWarp prst="textNoShape">
-                <a:avLst/>
-              </a:prstTxWarp>
-              <a:noAutofit/>
-            </a:bodyPr>
-            <a:lstStyle/>
-            <a:p>
-              <a:pPr algn="ctr"/>
-              <a:r>
-                <a:rPr lang="en-US" sz="675" dirty="0"/>
-                <a:t>external</a:t>
-              </a:r>
-            </a:p>
-          </p:txBody>
-        </p:sp>
-        <p:sp>
-          <p:nvSpPr>
-            <p:cNvPr id="142" name="Flowchart: Process 141">
-              <a:extLst>
-                <a:ext uri="{FF2B5EF4-FFF2-40B4-BE49-F238E27FC236}">
-                  <a16:creationId xmlns:a16="http://schemas.microsoft.com/office/drawing/2014/main" id="{4614A37A-3D71-4A9A-8D3A-E21EDDF2B53A}"/>
-                </a:ext>
-              </a:extLst>
-            </p:cNvPr>
-            <p:cNvSpPr/>
-            <p:nvPr/>
-          </p:nvSpPr>
-          <p:spPr>
-            <a:xfrm>
-              <a:off x="798262" y="6095603"/>
-              <a:ext cx="753638" cy="235196"/>
-            </a:xfrm>
-            <a:prstGeom prst="flowChartProcess">
-              <a:avLst/>
-            </a:prstGeom>
-            <a:solidFill>
-              <a:schemeClr val="accent1"/>
-            </a:solidFill>
-          </p:spPr>
-          <p:style>
-            <a:lnRef idx="2">
-              <a:schemeClr val="accent1">
-                <a:shade val="50000"/>
-              </a:schemeClr>
-            </a:lnRef>
-            <a:fillRef idx="1">
-              <a:schemeClr val="accent1"/>
-            </a:fillRef>
-            <a:effectRef idx="0">
-              <a:schemeClr val="accent1"/>
-            </a:effectRef>
-            <a:fontRef idx="minor">
-              <a:schemeClr val="lt1"/>
-            </a:fontRef>
-          </p:style>
-          <p:txBody>
-            <a:bodyPr rot="0" spcFirstLastPara="0" vertOverflow="overflow" horzOverflow="overflow" vert="horz" wrap="square" lIns="20250" tIns="20250" rIns="20250" bIns="20250" numCol="1" spcCol="0" rtlCol="0" fromWordArt="0" anchor="ctr" anchorCtr="0" forceAA="0" compatLnSpc="1">
-              <a:prstTxWarp prst="textNoShape">
-                <a:avLst/>
-              </a:prstTxWarp>
-              <a:noAutofit/>
-            </a:bodyPr>
-            <a:lstStyle/>
-            <a:p>
-              <a:pPr algn="ctr"/>
-              <a:r>
-                <a:rPr lang="en-US" sz="675" dirty="0"/>
-                <a:t>runtime</a:t>
-              </a:r>
-            </a:p>
-          </p:txBody>
-        </p:sp>
-        <p:sp>
-          <p:nvSpPr>
-            <p:cNvPr id="143" name="TextBox 142">
-              <a:extLst>
-                <a:ext uri="{FF2B5EF4-FFF2-40B4-BE49-F238E27FC236}">
-                  <a16:creationId xmlns:a16="http://schemas.microsoft.com/office/drawing/2014/main" id="{FB8A3199-3332-48A5-B07F-AF8229595CD6}"/>
-                </a:ext>
-              </a:extLst>
-            </p:cNvPr>
-            <p:cNvSpPr txBox="1"/>
-            <p:nvPr/>
-          </p:nvSpPr>
-          <p:spPr>
-            <a:xfrm>
-              <a:off x="1239914" y="5262471"/>
-              <a:ext cx="1120140" cy="411737"/>
-            </a:xfrm>
-            <a:prstGeom prst="rect">
-              <a:avLst/>
-            </a:prstGeom>
-            <a:noFill/>
-          </p:spPr>
-          <p:txBody>
-            <a:bodyPr wrap="square" rtlCol="0">
-              <a:spAutoFit/>
-            </a:bodyPr>
-            <a:lstStyle/>
-            <a:p>
-              <a:pPr>
-                <a:lnSpc>
-                  <a:spcPct val="150000"/>
-                </a:lnSpc>
-              </a:pPr>
-              <a:r>
-                <a:rPr lang="en-US" sz="675" dirty="0"/>
-                <a:t>Data flow</a:t>
-              </a:r>
-            </a:p>
-          </p:txBody>
-        </p:sp>
-        <p:sp>
-          <p:nvSpPr>
-            <p:cNvPr id="144" name="Flowchart: Process 143">
-              <a:extLst>
-                <a:ext uri="{FF2B5EF4-FFF2-40B4-BE49-F238E27FC236}">
-                  <a16:creationId xmlns:a16="http://schemas.microsoft.com/office/drawing/2014/main" id="{8655A786-CBC0-4ADE-968D-4B438BEAF438}"/>
-                </a:ext>
-              </a:extLst>
-            </p:cNvPr>
-            <p:cNvSpPr/>
-            <p:nvPr/>
-          </p:nvSpPr>
-          <p:spPr>
-            <a:xfrm>
-              <a:off x="620111" y="5262472"/>
-              <a:ext cx="1437287" cy="1245826"/>
-            </a:xfrm>
-            <a:prstGeom prst="flowChartProcess">
-              <a:avLst/>
-            </a:prstGeom>
-            <a:noFill/>
-          </p:spPr>
-          <p:style>
-            <a:lnRef idx="2">
-              <a:schemeClr val="accent1">
-                <a:shade val="50000"/>
-              </a:schemeClr>
-            </a:lnRef>
-            <a:fillRef idx="1">
-              <a:schemeClr val="accent1"/>
-            </a:fillRef>
-            <a:effectRef idx="0">
-              <a:schemeClr val="accent1"/>
-            </a:effectRef>
-            <a:fontRef idx="minor">
-              <a:schemeClr val="lt1"/>
-            </a:fontRef>
-          </p:style>
-          <p:txBody>
-            <a:bodyPr rtlCol="0" anchor="ctr"/>
-            <a:lstStyle/>
-            <a:p>
-              <a:pPr algn="ctr"/>
-              <a:endParaRPr lang="en-US" sz="900"/>
-            </a:p>
-          </p:txBody>
-        </p:sp>
-      </p:grpSp>
-      <p:sp>
-        <p:nvSpPr>
-          <p:cNvPr id="145" name="Flowchart: Process 144">
-            <a:extLst>
-              <a:ext uri="{FF2B5EF4-FFF2-40B4-BE49-F238E27FC236}">
-                <a16:creationId xmlns:a16="http://schemas.microsoft.com/office/drawing/2014/main" id="{F0215466-5909-434C-9BFB-C60A13E5040E}"/>
-              </a:ext>
-            </a:extLst>
-          </p:cNvPr>
-          <p:cNvSpPr/>
-          <p:nvPr/>
-        </p:nvSpPr>
-        <p:spPr>
-          <a:xfrm>
-            <a:off x="1566714" y="3372848"/>
-            <a:ext cx="3706531" cy="2538817"/>
-          </a:xfrm>
-          <a:prstGeom prst="flowChartProcess">
-            <a:avLst/>
-          </a:prstGeom>
-          <a:noFill/>
-        </p:spPr>
-        <p:style>
-          <a:lnRef idx="2">
-            <a:schemeClr val="accent1">
-              <a:shade val="50000"/>
-            </a:schemeClr>
-          </a:lnRef>
-          <a:fillRef idx="1">
-            <a:schemeClr val="accent1"/>
-          </a:fillRef>
-          <a:effectRef idx="0">
-            <a:schemeClr val="accent1"/>
-          </a:effectRef>
-          <a:fontRef idx="minor">
-            <a:schemeClr val="lt1"/>
-          </a:fontRef>
-        </p:style>
-        <p:txBody>
-          <a:bodyPr rtlCol="0" anchor="ctr"/>
-          <a:lstStyle/>
-          <a:p>
-            <a:pPr algn="ctr"/>
-            <a:endParaRPr lang="en-US" sz="900"/>
-          </a:p>
-        </p:txBody>
-      </p:sp>
-      <p:sp>
-        <p:nvSpPr>
-          <p:cNvPr id="50" name="Flowchart: Process 49">
-            <a:extLst>
-              <a:ext uri="{FF2B5EF4-FFF2-40B4-BE49-F238E27FC236}">
-                <a16:creationId xmlns:a16="http://schemas.microsoft.com/office/drawing/2014/main" id="{26A7D86C-5D00-479B-9DF1-AB34B884DF4E}"/>
-              </a:ext>
-            </a:extLst>
-          </p:cNvPr>
-          <p:cNvSpPr/>
-          <p:nvPr/>
-        </p:nvSpPr>
-        <p:spPr>
-          <a:xfrm>
-            <a:off x="2729422" y="6502999"/>
-            <a:ext cx="708750" cy="324000"/>
-          </a:xfrm>
-          <a:prstGeom prst="flowChartProcess">
-            <a:avLst/>
-          </a:prstGeom>
-        </p:spPr>
-        <p:style>
-          <a:lnRef idx="2">
-            <a:schemeClr val="accent1">
-              <a:shade val="50000"/>
-            </a:schemeClr>
-          </a:lnRef>
-          <a:fillRef idx="1">
-            <a:schemeClr val="accent1"/>
-          </a:fillRef>
-          <a:effectRef idx="0">
-            <a:schemeClr val="accent1"/>
-          </a:effectRef>
-          <a:fontRef idx="minor">
-            <a:schemeClr val="lt1"/>
-          </a:fontRef>
-        </p:style>
-        <p:txBody>
-          <a:bodyPr rot="0" spcFirstLastPara="0" vertOverflow="overflow" horzOverflow="overflow" vert="horz" wrap="square" lIns="20250" tIns="20250" rIns="20250" bIns="20250" numCol="1" spcCol="0" rtlCol="0" fromWordArt="0" anchor="ctr" anchorCtr="0" forceAA="0" compatLnSpc="1">
-            <a:prstTxWarp prst="textNoShape">
-              <a:avLst/>
-            </a:prstTxWarp>
-            <a:noAutofit/>
-          </a:bodyPr>
-          <a:lstStyle/>
-          <a:p>
-            <a:pPr algn="ctr"/>
-            <a:r>
-              <a:rPr lang="en-US" sz="900" dirty="0"/>
-              <a:t>Mendix Client</a:t>
-            </a:r>
-          </a:p>
-        </p:txBody>
-      </p:sp>
-      <p:cxnSp>
-        <p:nvCxnSpPr>
-          <p:cNvPr id="54" name="Connector: Elbow 9">
-            <a:extLst>
-              <a:ext uri="{FF2B5EF4-FFF2-40B4-BE49-F238E27FC236}">
-                <a16:creationId xmlns:a16="http://schemas.microsoft.com/office/drawing/2014/main" id="{A0A085FA-C58E-4C26-978D-11B237D8D86F}"/>
-              </a:ext>
-            </a:extLst>
-          </p:cNvPr>
-          <p:cNvCxnSpPr>
-            <a:cxnSpLocks/>
-            <a:stCxn id="50" idx="0"/>
-            <a:endCxn id="26" idx="2"/>
-          </p:cNvCxnSpPr>
-          <p:nvPr/>
-        </p:nvCxnSpPr>
-        <p:spPr>
-          <a:xfrm flipV="1">
-            <a:off x="3083797" y="6329026"/>
-            <a:ext cx="0" cy="173975"/>
-          </a:xfrm>
-          <a:prstGeom prst="straightConnector1">
-            <a:avLst/>
-          </a:prstGeom>
-          <a:ln w="22225">
-            <a:headEnd type="triangle" w="lg" len="lg"/>
-            <a:tailEnd type="triangle" w="lg" len="lg"/>
-          </a:ln>
-        </p:spPr>
-        <p:style>
-          <a:lnRef idx="1">
-            <a:schemeClr val="accent1"/>
-          </a:lnRef>
-          <a:fillRef idx="0">
-            <a:schemeClr val="accent1"/>
-          </a:fillRef>
-          <a:effectRef idx="0">
-            <a:schemeClr val="accent1"/>
-          </a:effectRef>
-          <a:fontRef idx="minor">
-            <a:schemeClr val="tx1"/>
-          </a:fontRef>
-        </p:style>
-      </p:cxnSp>
-      <p:sp>
-        <p:nvSpPr>
-          <p:cNvPr id="108" name="Flowchart: Process 107">
-            <a:extLst>
-              <a:ext uri="{FF2B5EF4-FFF2-40B4-BE49-F238E27FC236}">
-                <a16:creationId xmlns:a16="http://schemas.microsoft.com/office/drawing/2014/main" id="{FC2753EA-6BEB-46DF-88CA-C005E464029E}"/>
-              </a:ext>
-            </a:extLst>
-          </p:cNvPr>
-          <p:cNvSpPr/>
-          <p:nvPr/>
-        </p:nvSpPr>
-        <p:spPr>
-          <a:xfrm>
-            <a:off x="5433140" y="4022936"/>
-            <a:ext cx="708750" cy="324000"/>
-          </a:xfrm>
-          <a:prstGeom prst="flowChartProcess">
-            <a:avLst/>
-          </a:prstGeom>
-          <a:solidFill>
-            <a:schemeClr val="accent2">
-              <a:lumMod val="75000"/>
-            </a:schemeClr>
-          </a:solidFill>
-        </p:spPr>
-        <p:style>
-          <a:lnRef idx="2">
-            <a:schemeClr val="accent1">
-              <a:shade val="50000"/>
-            </a:schemeClr>
-          </a:lnRef>
-          <a:fillRef idx="1">
-            <a:schemeClr val="accent1"/>
-          </a:fillRef>
-          <a:effectRef idx="0">
-            <a:schemeClr val="accent1"/>
-          </a:effectRef>
-          <a:fontRef idx="minor">
-            <a:schemeClr val="lt1"/>
-          </a:fontRef>
-        </p:style>
-        <p:txBody>
-          <a:bodyPr rot="0" spcFirstLastPara="0" vertOverflow="overflow" horzOverflow="overflow" vert="horz" wrap="square" lIns="20250" tIns="20250" rIns="20250" bIns="20250" numCol="1" spcCol="0" rtlCol="0" fromWordArt="0" anchor="ctr" anchorCtr="0" forceAA="0" compatLnSpc="1">
-            <a:prstTxWarp prst="textNoShape">
-              <a:avLst/>
-            </a:prstTxWarp>
-            <a:noAutofit/>
-          </a:bodyPr>
-          <a:lstStyle/>
-          <a:p>
-            <a:pPr algn="ctr"/>
-            <a:r>
-              <a:rPr lang="en-US" sz="900" dirty="0"/>
-              <a:t>External Service</a:t>
-            </a:r>
-          </a:p>
-        </p:txBody>
-      </p:sp>
-      <p:sp>
-        <p:nvSpPr>
-          <p:cNvPr id="51" name="Flowchart: Process 50">
-            <a:extLst>
-              <a:ext uri="{FF2B5EF4-FFF2-40B4-BE49-F238E27FC236}">
-                <a16:creationId xmlns:a16="http://schemas.microsoft.com/office/drawing/2014/main" id="{AA7D4884-AAE2-4BAB-A939-06BB62A384C2}"/>
-              </a:ext>
-            </a:extLst>
-          </p:cNvPr>
-          <p:cNvSpPr/>
-          <p:nvPr/>
-        </p:nvSpPr>
-        <p:spPr>
-          <a:xfrm>
-            <a:off x="720825" y="3251240"/>
-            <a:ext cx="708750" cy="324000"/>
-          </a:xfrm>
-          <a:prstGeom prst="flowChartProcess">
-            <a:avLst/>
-          </a:prstGeom>
-          <a:solidFill>
-            <a:schemeClr val="accent2">
-              <a:lumMod val="75000"/>
-            </a:schemeClr>
-          </a:solidFill>
-        </p:spPr>
-        <p:style>
-          <a:lnRef idx="2">
-            <a:schemeClr val="accent1">
-              <a:shade val="50000"/>
-            </a:schemeClr>
-          </a:lnRef>
-          <a:fillRef idx="1">
-            <a:schemeClr val="accent1"/>
-          </a:fillRef>
-          <a:effectRef idx="0">
-            <a:schemeClr val="accent1"/>
-          </a:effectRef>
-          <a:fontRef idx="minor">
-            <a:schemeClr val="lt1"/>
-          </a:fontRef>
-        </p:style>
-        <p:txBody>
-          <a:bodyPr rot="0" spcFirstLastPara="0" vertOverflow="overflow" horzOverflow="overflow" vert="horz" wrap="square" lIns="20250" tIns="20250" rIns="20250" bIns="20250" numCol="1" spcCol="0" rtlCol="0" fromWordArt="0" anchor="ctr" anchorCtr="0" forceAA="0" compatLnSpc="1">
-            <a:prstTxWarp prst="textNoShape">
-              <a:avLst/>
-            </a:prstTxWarp>
-            <a:noAutofit/>
-          </a:bodyPr>
-          <a:lstStyle/>
-          <a:p>
-            <a:pPr algn="ctr"/>
-            <a:r>
-              <a:rPr lang="en-US" sz="900" dirty="0"/>
-              <a:t>m2ee</a:t>
-            </a:r>
-          </a:p>
-        </p:txBody>
-      </p:sp>
-      <p:cxnSp>
-        <p:nvCxnSpPr>
-          <p:cNvPr id="56" name="Connector: Elbow 9">
-            <a:extLst>
-              <a:ext uri="{FF2B5EF4-FFF2-40B4-BE49-F238E27FC236}">
-                <a16:creationId xmlns:a16="http://schemas.microsoft.com/office/drawing/2014/main" id="{5CCD0223-F3B3-4F8C-B4D6-90B126586116}"/>
-              </a:ext>
-            </a:extLst>
-          </p:cNvPr>
-          <p:cNvCxnSpPr>
-            <a:cxnSpLocks/>
-            <a:stCxn id="20" idx="1"/>
-            <a:endCxn id="51" idx="3"/>
-          </p:cNvCxnSpPr>
-          <p:nvPr/>
-        </p:nvCxnSpPr>
-        <p:spPr>
-          <a:xfrm flipH="1" flipV="1">
-            <a:off x="1429576" y="3413240"/>
-            <a:ext cx="177396" cy="1"/>
-          </a:xfrm>
-          <a:prstGeom prst="straightConnector1">
-            <a:avLst/>
-          </a:prstGeom>
-          <a:ln w="22225">
-            <a:headEnd type="triangle" w="lg" len="lg"/>
-            <a:tailEnd type="triangle" w="lg" len="lg"/>
-          </a:ln>
-        </p:spPr>
-        <p:style>
-          <a:lnRef idx="1">
-            <a:schemeClr val="accent1"/>
-          </a:lnRef>
-          <a:fillRef idx="0">
-            <a:schemeClr val="accent1"/>
-          </a:fillRef>
-          <a:effectRef idx="0">
-            <a:schemeClr val="accent1"/>
-          </a:effectRef>
-          <a:fontRef idx="minor">
-            <a:schemeClr val="tx1"/>
-          </a:fontRef>
-        </p:style>
-      </p:cxnSp>
-      <p:sp>
-        <p:nvSpPr>
-          <p:cNvPr id="66" name="Flowchart: Process 65">
-            <a:extLst>
-              <a:ext uri="{FF2B5EF4-FFF2-40B4-BE49-F238E27FC236}">
-                <a16:creationId xmlns:a16="http://schemas.microsoft.com/office/drawing/2014/main" id="{CE11BB22-39AB-45BC-BA34-0EDC8013D5FC}"/>
-              </a:ext>
-            </a:extLst>
-          </p:cNvPr>
-          <p:cNvSpPr/>
-          <p:nvPr/>
-        </p:nvSpPr>
-        <p:spPr>
-          <a:xfrm>
-            <a:off x="4448998" y="4484088"/>
-            <a:ext cx="708750" cy="324000"/>
-          </a:xfrm>
-          <a:prstGeom prst="flowChartProcess">
-            <a:avLst/>
-          </a:prstGeom>
-        </p:spPr>
-        <p:style>
-          <a:lnRef idx="2">
-            <a:schemeClr val="accent1">
-              <a:shade val="50000"/>
-            </a:schemeClr>
-          </a:lnRef>
-          <a:fillRef idx="1">
-            <a:schemeClr val="accent1"/>
-          </a:fillRef>
-          <a:effectRef idx="0">
-            <a:schemeClr val="accent1"/>
-          </a:effectRef>
-          <a:fontRef idx="minor">
-            <a:schemeClr val="lt1"/>
-          </a:fontRef>
-        </p:style>
-        <p:txBody>
-          <a:bodyPr rot="0" spcFirstLastPara="0" vertOverflow="overflow" horzOverflow="overflow" vert="horz" wrap="square" lIns="20250" tIns="20250" rIns="20250" bIns="20250" numCol="1" spcCol="0" rtlCol="0" fromWordArt="0" anchor="ctr" anchorCtr="0" forceAA="0" compatLnSpc="1">
-            <a:prstTxWarp prst="textNoShape">
-              <a:avLst/>
-            </a:prstTxWarp>
-            <a:noAutofit/>
-          </a:bodyPr>
-          <a:lstStyle/>
-          <a:p>
-            <a:pPr algn="ctr"/>
-            <a:r>
-              <a:rPr lang="en-US" sz="900" dirty="0"/>
-              <a:t>Scheduler</a:t>
-            </a:r>
-          </a:p>
-        </p:txBody>
-      </p:sp>
-      <p:cxnSp>
-        <p:nvCxnSpPr>
-          <p:cNvPr id="72" name="Connector: Elbow 9">
-            <a:extLst>
-              <a:ext uri="{FF2B5EF4-FFF2-40B4-BE49-F238E27FC236}">
-                <a16:creationId xmlns:a16="http://schemas.microsoft.com/office/drawing/2014/main" id="{9A8D4538-0FED-4232-B11A-C240DCA45374}"/>
-              </a:ext>
-            </a:extLst>
-          </p:cNvPr>
-          <p:cNvCxnSpPr>
-            <a:cxnSpLocks/>
-            <a:endCxn id="22" idx="0"/>
-          </p:cNvCxnSpPr>
-          <p:nvPr/>
-        </p:nvCxnSpPr>
-        <p:spPr>
-          <a:xfrm flipH="1">
-            <a:off x="4421662" y="4832109"/>
-            <a:ext cx="394182" cy="163959"/>
-          </a:xfrm>
-          <a:prstGeom prst="straightConnector1">
-            <a:avLst/>
-          </a:prstGeom>
-          <a:ln w="22225">
-            <a:headEnd type="none" w="lg" len="lg"/>
-            <a:tailEnd type="triangle" w="lg" len="lg"/>
-          </a:ln>
-        </p:spPr>
-        <p:style>
-          <a:lnRef idx="1">
-            <a:schemeClr val="accent1"/>
-          </a:lnRef>
-          <a:fillRef idx="0">
-            <a:schemeClr val="accent1"/>
-          </a:fillRef>
-          <a:effectRef idx="0">
-            <a:schemeClr val="accent1"/>
-          </a:effectRef>
-          <a:fontRef idx="minor">
-            <a:schemeClr val="tx1"/>
-          </a:fontRef>
-        </p:style>
-      </p:cxnSp>
-      <p:cxnSp>
-        <p:nvCxnSpPr>
-          <p:cNvPr id="75" name="Connector: Elbow 9">
-            <a:extLst>
-              <a:ext uri="{FF2B5EF4-FFF2-40B4-BE49-F238E27FC236}">
-                <a16:creationId xmlns:a16="http://schemas.microsoft.com/office/drawing/2014/main" id="{A244417B-75BA-4C07-B51D-6D0450D5626F}"/>
-              </a:ext>
-            </a:extLst>
-          </p:cNvPr>
-          <p:cNvCxnSpPr>
-            <a:cxnSpLocks/>
-            <a:stCxn id="66" idx="1"/>
-            <a:endCxn id="9" idx="3"/>
-          </p:cNvCxnSpPr>
-          <p:nvPr/>
-        </p:nvCxnSpPr>
-        <p:spPr>
-          <a:xfrm flipH="1">
-            <a:off x="4332329" y="4646088"/>
-            <a:ext cx="116669" cy="0"/>
-          </a:xfrm>
-          <a:prstGeom prst="straightConnector1">
-            <a:avLst/>
-          </a:prstGeom>
-          <a:ln w="22225">
-            <a:headEnd type="none" w="lg" len="lg"/>
-            <a:tailEnd type="triangle" w="lg" len="lg"/>
-          </a:ln>
-        </p:spPr>
-        <p:style>
-          <a:lnRef idx="1">
-            <a:schemeClr val="accent1"/>
-          </a:lnRef>
-          <a:fillRef idx="0">
-            <a:schemeClr val="accent1"/>
-          </a:fillRef>
-          <a:effectRef idx="0">
-            <a:schemeClr val="accent1"/>
-          </a:effectRef>
-          <a:fontRef idx="minor">
-            <a:schemeClr val="tx1"/>
-          </a:fontRef>
-        </p:style>
-      </p:cxnSp>
-      <p:sp>
-        <p:nvSpPr>
-          <p:cNvPr id="100" name="Flowchart: Process 99">
-            <a:extLst>
-              <a:ext uri="{FF2B5EF4-FFF2-40B4-BE49-F238E27FC236}">
-                <a16:creationId xmlns:a16="http://schemas.microsoft.com/office/drawing/2014/main" id="{30AE32DB-9F56-4283-BF70-FCC9DE8DA172}"/>
-              </a:ext>
-            </a:extLst>
-          </p:cNvPr>
-          <p:cNvSpPr/>
-          <p:nvPr/>
-        </p:nvSpPr>
-        <p:spPr>
-          <a:xfrm>
-            <a:off x="2729422" y="5362076"/>
-            <a:ext cx="708750" cy="376651"/>
-          </a:xfrm>
-          <a:prstGeom prst="flowChartProcess">
-            <a:avLst/>
-          </a:prstGeom>
-        </p:spPr>
-        <p:style>
-          <a:lnRef idx="2">
-            <a:schemeClr val="accent1">
-              <a:shade val="50000"/>
-            </a:schemeClr>
-          </a:lnRef>
-          <a:fillRef idx="1">
-            <a:schemeClr val="accent1"/>
-          </a:fillRef>
-          <a:effectRef idx="0">
-            <a:schemeClr val="accent1"/>
-          </a:effectRef>
-          <a:fontRef idx="minor">
-            <a:schemeClr val="lt1"/>
-          </a:fontRef>
-        </p:style>
-        <p:txBody>
-          <a:bodyPr rot="0" spcFirstLastPara="0" vertOverflow="overflow" horzOverflow="overflow" vert="horz" wrap="square" lIns="20250" tIns="20250" rIns="20250" bIns="20250" numCol="1" spcCol="0" rtlCol="0" fromWordArt="0" anchor="ctr" anchorCtr="0" forceAA="0" compatLnSpc="1">
-            <a:prstTxWarp prst="textNoShape">
-              <a:avLst/>
-            </a:prstTxWarp>
-            <a:noAutofit/>
-          </a:bodyPr>
-          <a:lstStyle/>
-          <a:p>
-            <a:pPr algn="ctr"/>
-            <a:r>
-              <a:rPr lang="en-US" sz="900" dirty="0"/>
-              <a:t>Custom Request</a:t>
-            </a:r>
-          </a:p>
-          <a:p>
-            <a:pPr algn="ctr"/>
-            <a:r>
-              <a:rPr lang="en-US" sz="900" dirty="0"/>
-              <a:t>Handler</a:t>
-            </a:r>
-          </a:p>
-        </p:txBody>
-      </p:sp>
-      <p:cxnSp>
-        <p:nvCxnSpPr>
-          <p:cNvPr id="101" name="Connector: Elbow 9">
-            <a:extLst>
-              <a:ext uri="{FF2B5EF4-FFF2-40B4-BE49-F238E27FC236}">
-                <a16:creationId xmlns:a16="http://schemas.microsoft.com/office/drawing/2014/main" id="{C7AA2C14-AE24-49A3-B55F-B086B7ECBD80}"/>
-              </a:ext>
-            </a:extLst>
-          </p:cNvPr>
-          <p:cNvCxnSpPr>
-            <a:cxnSpLocks/>
-            <a:stCxn id="26" idx="0"/>
-            <a:endCxn id="100" idx="2"/>
-          </p:cNvCxnSpPr>
-          <p:nvPr/>
-        </p:nvCxnSpPr>
-        <p:spPr>
-          <a:xfrm flipV="1">
-            <a:off x="3083797" y="5738727"/>
-            <a:ext cx="0" cy="266297"/>
-          </a:xfrm>
-          <a:prstGeom prst="straightConnector1">
-            <a:avLst/>
-          </a:prstGeom>
-          <a:ln w="22225">
-            <a:headEnd type="triangle" w="lg" len="lg"/>
-            <a:tailEnd type="triangle" w="lg" len="lg"/>
-          </a:ln>
-        </p:spPr>
-        <p:style>
-          <a:lnRef idx="1">
-            <a:schemeClr val="accent1"/>
-          </a:lnRef>
-          <a:fillRef idx="0">
-            <a:schemeClr val="accent1"/>
-          </a:fillRef>
-          <a:effectRef idx="0">
-            <a:schemeClr val="accent1"/>
-          </a:effectRef>
-          <a:fontRef idx="minor">
-            <a:schemeClr val="tx1"/>
-          </a:fontRef>
-        </p:style>
-      </p:cxnSp>
-      <p:cxnSp>
-        <p:nvCxnSpPr>
-          <p:cNvPr id="104" name="Connector: Elbow 9">
-            <a:extLst>
-              <a:ext uri="{FF2B5EF4-FFF2-40B4-BE49-F238E27FC236}">
-                <a16:creationId xmlns:a16="http://schemas.microsoft.com/office/drawing/2014/main" id="{A9FCA370-CCE7-4935-A0C1-6D8DA4448EB5}"/>
-              </a:ext>
-            </a:extLst>
-          </p:cNvPr>
-          <p:cNvCxnSpPr>
-            <a:cxnSpLocks/>
-            <a:stCxn id="100" idx="0"/>
-            <a:endCxn id="17" idx="2"/>
-          </p:cNvCxnSpPr>
-          <p:nvPr/>
-        </p:nvCxnSpPr>
-        <p:spPr>
-          <a:xfrm flipV="1">
-            <a:off x="3083797" y="4808088"/>
-            <a:ext cx="0" cy="553988"/>
-          </a:xfrm>
-          <a:prstGeom prst="straightConnector1">
-            <a:avLst/>
-          </a:prstGeom>
-          <a:ln w="22225">
-            <a:headEnd type="triangle" w="lg" len="lg"/>
-            <a:tailEnd type="triangle" w="lg" len="lg"/>
-          </a:ln>
-        </p:spPr>
-        <p:style>
-          <a:lnRef idx="1">
-            <a:schemeClr val="accent1"/>
-          </a:lnRef>
-          <a:fillRef idx="0">
-            <a:schemeClr val="accent1"/>
-          </a:fillRef>
-          <a:effectRef idx="0">
-            <a:schemeClr val="accent1"/>
-          </a:effectRef>
-          <a:fontRef idx="minor">
-            <a:schemeClr val="tx1"/>
-          </a:fontRef>
-        </p:style>
-      </p:cxnSp>
-      <p:cxnSp>
-        <p:nvCxnSpPr>
-          <p:cNvPr id="107" name="Connector: Elbow 9">
-            <a:extLst>
-              <a:ext uri="{FF2B5EF4-FFF2-40B4-BE49-F238E27FC236}">
-                <a16:creationId xmlns:a16="http://schemas.microsoft.com/office/drawing/2014/main" id="{9504EAE4-227D-49AA-8D24-7BB761D35AE1}"/>
-              </a:ext>
-            </a:extLst>
-          </p:cNvPr>
-          <p:cNvCxnSpPr>
-            <a:cxnSpLocks/>
-            <a:stCxn id="100" idx="0"/>
-            <a:endCxn id="9" idx="2"/>
-          </p:cNvCxnSpPr>
-          <p:nvPr/>
-        </p:nvCxnSpPr>
-        <p:spPr>
-          <a:xfrm flipV="1">
-            <a:off x="3083799" y="4808090"/>
-            <a:ext cx="894157" cy="553988"/>
-          </a:xfrm>
-          <a:prstGeom prst="straightConnector1">
-            <a:avLst/>
-          </a:prstGeom>
-          <a:ln w="22225">
-            <a:headEnd type="triangle" w="lg" len="lg"/>
-            <a:tailEnd type="triangle" w="lg" len="lg"/>
-          </a:ln>
-        </p:spPr>
-        <p:style>
-          <a:lnRef idx="1">
-            <a:schemeClr val="accent1"/>
-          </a:lnRef>
-          <a:fillRef idx="0">
-            <a:schemeClr val="accent1"/>
-          </a:fillRef>
-          <a:effectRef idx="0">
-            <a:schemeClr val="accent1"/>
-          </a:effectRef>
-          <a:fontRef idx="minor">
-            <a:schemeClr val="tx1"/>
-          </a:fontRef>
-        </p:style>
-      </p:cxnSp>
-      <p:cxnSp>
-        <p:nvCxnSpPr>
-          <p:cNvPr id="110" name="Connector: Elbow 9">
-            <a:extLst>
-              <a:ext uri="{FF2B5EF4-FFF2-40B4-BE49-F238E27FC236}">
-                <a16:creationId xmlns:a16="http://schemas.microsoft.com/office/drawing/2014/main" id="{8BD62E43-71ED-4543-8112-EC0034A56867}"/>
-              </a:ext>
-            </a:extLst>
-          </p:cNvPr>
-          <p:cNvCxnSpPr>
-            <a:cxnSpLocks/>
-            <a:stCxn id="16" idx="0"/>
-            <a:endCxn id="9" idx="2"/>
-          </p:cNvCxnSpPr>
-          <p:nvPr/>
-        </p:nvCxnSpPr>
-        <p:spPr>
-          <a:xfrm flipV="1">
-            <a:off x="2120927" y="4808089"/>
-            <a:ext cx="1857027" cy="580314"/>
-          </a:xfrm>
-          <a:prstGeom prst="straightConnector1">
-            <a:avLst/>
-          </a:prstGeom>
-          <a:ln w="22225">
-            <a:headEnd type="triangle" w="lg" len="lg"/>
-            <a:tailEnd type="triangle" w="lg" len="lg"/>
-          </a:ln>
-        </p:spPr>
-        <p:style>
-          <a:lnRef idx="1">
-            <a:schemeClr val="accent1"/>
-          </a:lnRef>
-          <a:fillRef idx="0">
-            <a:schemeClr val="accent1"/>
-          </a:fillRef>
-          <a:effectRef idx="0">
-            <a:schemeClr val="accent1"/>
-          </a:effectRef>
-          <a:fontRef idx="minor">
-            <a:schemeClr val="tx1"/>
-          </a:fontRef>
-        </p:style>
-      </p:cxnSp>
-    </p:spTree>
-    <p:extLst>
-      <p:ext uri="{BB962C8B-B14F-4D97-AF65-F5344CB8AC3E}">
-        <p14:creationId xmlns:p14="http://schemas.microsoft.com/office/powerpoint/2010/main" val="1951963488"/>
-      </p:ext>
-    </p:extLst>
-  </p:cSld>
-  <p:clrMapOvr>
-    <a:masterClrMapping/>
-  </p:clrMapOvr>
-</p:sld>
-</file>
-
-<file path=ppt/slides/slide2.xml><?xml version="1.0" encoding="utf-8"?>
-<p:sld xmlns:a="http://schemas.openxmlformats.org/drawingml/2006/main" xmlns:r="http://schemas.openxmlformats.org/officeDocument/2006/relationships" xmlns:p="http://schemas.openxmlformats.org/presentationml/2006/main">
-  <p:cSld>
-    <p:spTree>
-      <p:nvGrpSpPr>
-        <p:cNvPr id="1" name=""/>
-        <p:cNvGrpSpPr/>
-        <p:nvPr/>
-      </p:nvGrpSpPr>
-      <p:grpSpPr>
-        <a:xfrm>
-          <a:off x="0" y="0"/>
-          <a:ext cx="0" cy="0"/>
-          <a:chOff x="0" y="0"/>
-          <a:chExt cx="0" cy="0"/>
-        </a:xfrm>
-      </p:grpSpPr>
       <p:sp>
         <p:nvSpPr>
           <p:cNvPr id="13" name="Flowchart: Process 12">
@@ -7031,13 +4096,6 @@
               <a:rPr lang="en-US" sz="1200" dirty="0"/>
               <a:t>Test MyApp-v4</a:t>
             </a:r>
-            <a:br>
-              <a:rPr lang="en-US" sz="1200" dirty="0"/>
-            </a:br>
-            <a:r>
-              <a:rPr lang="en-US" sz="1200" dirty="0"/>
-              <a:t>(optional)</a:t>
-            </a:r>
           </a:p>
         </p:txBody>
       </p:sp>
@@ -7102,7 +4160,7 @@
             <a:pPr algn="ctr"/>
             <a:r>
               <a:rPr lang="en-US" sz="1200" dirty="0"/>
-              <a:t>Replicate Data and Files (to 100%)</a:t>
+              <a:t>Replicate Data and Files</a:t>
             </a:r>
           </a:p>
         </p:txBody>
@@ -7652,7 +4710,7 @@
                   <a:schemeClr val="accent2"/>
                 </a:solidFill>
               </a:rPr>
-              <a:t>Cloud V3</a:t>
+              <a:t>Cloud V3 App Status</a:t>
             </a:r>
           </a:p>
         </p:txBody>
@@ -7717,7 +4775,7 @@
                   <a:schemeClr val="accent1"/>
                 </a:solidFill>
               </a:rPr>
-              <a:t>Cloud V4</a:t>
+              <a:t>Cloud V4 App Status</a:t>
             </a:r>
           </a:p>
         </p:txBody>
@@ -9007,13 +6065,15 @@
           </p:cNvPr>
           <p:cNvCxnSpPr>
             <a:cxnSpLocks/>
+            <a:stCxn id="53" idx="3"/>
+            <a:endCxn id="61" idx="1"/>
           </p:cNvCxnSpPr>
           <p:nvPr/>
         </p:nvCxnSpPr>
         <p:spPr>
-          <a:xfrm>
-            <a:off x="3807989" y="8032920"/>
-            <a:ext cx="949451" cy="0"/>
+          <a:xfrm flipV="1">
+            <a:off x="3807989" y="8324398"/>
+            <a:ext cx="949451" cy="4048"/>
           </a:xfrm>
           <a:prstGeom prst="straightConnector1">
             <a:avLst/>
@@ -9050,6 +6110,111 @@
           </a:fontRef>
         </p:style>
       </p:cxnSp>
+      <p:sp>
+        <p:nvSpPr>
+          <p:cNvPr id="4" name="TextBox 3">
+            <a:extLst>
+              <a:ext uri="{FF2B5EF4-FFF2-40B4-BE49-F238E27FC236}">
+                <a16:creationId xmlns:a16="http://schemas.microsoft.com/office/drawing/2014/main" id="{50E92F77-AF6F-4889-87CF-5DF05BB38ED4}"/>
+              </a:ext>
+            </a:extLst>
+          </p:cNvPr>
+          <p:cNvSpPr txBox="1"/>
+          <p:nvPr/>
+        </p:nvSpPr>
+        <p:spPr>
+          <a:xfrm>
+            <a:off x="4013827" y="4313762"/>
+            <a:ext cx="668219" cy="276999"/>
+          </a:xfrm>
+          <a:prstGeom prst="rect">
+            <a:avLst/>
+          </a:prstGeom>
+          <a:noFill/>
+        </p:spPr>
+        <p:txBody>
+          <a:bodyPr wrap="square" rtlCol="0">
+            <a:spAutoFit/>
+          </a:bodyPr>
+          <a:lstStyle/>
+          <a:p>
+            <a:r>
+              <a:rPr lang="en-US" sz="1200" dirty="0"/>
+              <a:t>Data</a:t>
+            </a:r>
+          </a:p>
+        </p:txBody>
+      </p:sp>
+      <p:sp>
+        <p:nvSpPr>
+          <p:cNvPr id="64" name="TextBox 63">
+            <a:extLst>
+              <a:ext uri="{FF2B5EF4-FFF2-40B4-BE49-F238E27FC236}">
+                <a16:creationId xmlns:a16="http://schemas.microsoft.com/office/drawing/2014/main" id="{6F630EDB-DE1A-4B20-9054-8E06316B7396}"/>
+              </a:ext>
+            </a:extLst>
+          </p:cNvPr>
+          <p:cNvSpPr txBox="1"/>
+          <p:nvPr/>
+        </p:nvSpPr>
+        <p:spPr>
+          <a:xfrm>
+            <a:off x="3807990" y="8131171"/>
+            <a:ext cx="949450" cy="430887"/>
+          </a:xfrm>
+          <a:prstGeom prst="rect">
+            <a:avLst/>
+          </a:prstGeom>
+          <a:noFill/>
+        </p:spPr>
+        <p:txBody>
+          <a:bodyPr wrap="square" rtlCol="0">
+            <a:spAutoFit/>
+          </a:bodyPr>
+          <a:lstStyle/>
+          <a:p>
+            <a:r>
+              <a:rPr lang="en-US" sz="1100" dirty="0"/>
+              <a:t>Production Data</a:t>
+            </a:r>
+          </a:p>
+        </p:txBody>
+      </p:sp>
+      <p:sp>
+        <p:nvSpPr>
+          <p:cNvPr id="65" name="TextBox 64">
+            <a:extLst>
+              <a:ext uri="{FF2B5EF4-FFF2-40B4-BE49-F238E27FC236}">
+                <a16:creationId xmlns:a16="http://schemas.microsoft.com/office/drawing/2014/main" id="{53E42628-76BF-4164-9409-8F82348FC4D3}"/>
+              </a:ext>
+            </a:extLst>
+          </p:cNvPr>
+          <p:cNvSpPr txBox="1"/>
+          <p:nvPr/>
+        </p:nvSpPr>
+        <p:spPr>
+          <a:xfrm>
+            <a:off x="4013827" y="6208853"/>
+            <a:ext cx="668219" cy="276999"/>
+          </a:xfrm>
+          <a:prstGeom prst="rect">
+            <a:avLst/>
+          </a:prstGeom>
+          <a:noFill/>
+        </p:spPr>
+        <p:txBody>
+          <a:bodyPr wrap="square" rtlCol="0">
+            <a:spAutoFit/>
+          </a:bodyPr>
+          <a:lstStyle/>
+          <a:p>
+            <a:r>
+              <a:rPr lang="en-US" sz="1200" dirty="0"/>
+              <a:t>Data</a:t>
+            </a:r>
+          </a:p>
+        </p:txBody>
+      </p:sp>
     </p:spTree>
     <p:extLst>
       <p:ext uri="{BB962C8B-B14F-4D97-AF65-F5344CB8AC3E}">

</xml_diff>